<commit_message>
update slides and geomodel sessions for 2024 autumn teaching
</commit_message>
<xml_diff>
--- a/extra/slides/ppt/intro/intro.pptx
+++ b/extra/slides/ppt/intro/intro.pptx
@@ -208,7 +208,7 @@
             <a:fld id="{A7B72033-589B-43AE-B8E1-AF9DC04A1F48}" type="datetimeFigureOut">
               <a:rPr lang="en-US" smtClean="0"/>
               <a:pPr/>
-              <a:t>1/22/2024</a:t>
+              <a:t>9/20/2024</a:t>
             </a:fld>
             <a:endParaRPr lang="en-US" dirty="0"/>
           </a:p>
@@ -627,7 +627,7 @@
           <a:p>
             <a:fld id="{C99BBB17-2D1A-4F24-B9AD-CEA35EC18396}" type="datetimeFigureOut">
               <a:rPr lang="en-US" smtClean="0"/>
-              <a:t>1/22/2024</a:t>
+              <a:t>9/20/2024</a:t>
             </a:fld>
             <a:endParaRPr lang="en-US"/>
           </a:p>
@@ -825,7 +825,7 @@
           <a:p>
             <a:fld id="{C99BBB17-2D1A-4F24-B9AD-CEA35EC18396}" type="datetimeFigureOut">
               <a:rPr lang="en-US" smtClean="0"/>
-              <a:t>1/22/2024</a:t>
+              <a:t>9/20/2024</a:t>
             </a:fld>
             <a:endParaRPr lang="en-US"/>
           </a:p>
@@ -1033,7 +1033,7 @@
           <a:p>
             <a:fld id="{C99BBB17-2D1A-4F24-B9AD-CEA35EC18396}" type="datetimeFigureOut">
               <a:rPr lang="en-US" smtClean="0"/>
-              <a:t>1/22/2024</a:t>
+              <a:t>9/20/2024</a:t>
             </a:fld>
             <a:endParaRPr lang="en-US"/>
           </a:p>
@@ -1231,7 +1231,7 @@
           <a:p>
             <a:fld id="{C99BBB17-2D1A-4F24-B9AD-CEA35EC18396}" type="datetimeFigureOut">
               <a:rPr lang="en-US" smtClean="0"/>
-              <a:t>1/22/2024</a:t>
+              <a:t>9/20/2024</a:t>
             </a:fld>
             <a:endParaRPr lang="en-US"/>
           </a:p>
@@ -1506,7 +1506,7 @@
           <a:p>
             <a:fld id="{C99BBB17-2D1A-4F24-B9AD-CEA35EC18396}" type="datetimeFigureOut">
               <a:rPr lang="en-US" smtClean="0"/>
-              <a:t>1/22/2024</a:t>
+              <a:t>9/20/2024</a:t>
             </a:fld>
             <a:endParaRPr lang="en-US"/>
           </a:p>
@@ -1771,7 +1771,7 @@
           <a:p>
             <a:fld id="{C99BBB17-2D1A-4F24-B9AD-CEA35EC18396}" type="datetimeFigureOut">
               <a:rPr lang="en-US" smtClean="0"/>
-              <a:t>1/22/2024</a:t>
+              <a:t>9/20/2024</a:t>
             </a:fld>
             <a:endParaRPr lang="en-US"/>
           </a:p>
@@ -2183,7 +2183,7 @@
           <a:p>
             <a:fld id="{C99BBB17-2D1A-4F24-B9AD-CEA35EC18396}" type="datetimeFigureOut">
               <a:rPr lang="en-US" smtClean="0"/>
-              <a:t>1/22/2024</a:t>
+              <a:t>9/20/2024</a:t>
             </a:fld>
             <a:endParaRPr lang="en-US"/>
           </a:p>
@@ -2324,7 +2324,7 @@
           <a:p>
             <a:fld id="{C99BBB17-2D1A-4F24-B9AD-CEA35EC18396}" type="datetimeFigureOut">
               <a:rPr lang="en-US" smtClean="0"/>
-              <a:t>1/22/2024</a:t>
+              <a:t>9/20/2024</a:t>
             </a:fld>
             <a:endParaRPr lang="en-US"/>
           </a:p>
@@ -2437,7 +2437,7 @@
           <a:p>
             <a:fld id="{C99BBB17-2D1A-4F24-B9AD-CEA35EC18396}" type="datetimeFigureOut">
               <a:rPr lang="en-US" smtClean="0"/>
-              <a:t>1/22/2024</a:t>
+              <a:t>9/20/2024</a:t>
             </a:fld>
             <a:endParaRPr lang="en-US"/>
           </a:p>
@@ -2748,7 +2748,7 @@
           <a:p>
             <a:fld id="{C99BBB17-2D1A-4F24-B9AD-CEA35EC18396}" type="datetimeFigureOut">
               <a:rPr lang="en-US" smtClean="0"/>
-              <a:t>1/22/2024</a:t>
+              <a:t>9/20/2024</a:t>
             </a:fld>
             <a:endParaRPr lang="en-US"/>
           </a:p>
@@ -3036,7 +3036,7 @@
           <a:p>
             <a:fld id="{C99BBB17-2D1A-4F24-B9AD-CEA35EC18396}" type="datetimeFigureOut">
               <a:rPr lang="en-US" smtClean="0"/>
-              <a:t>1/22/2024</a:t>
+              <a:t>9/20/2024</a:t>
             </a:fld>
             <a:endParaRPr lang="en-US"/>
           </a:p>
@@ -3279,7 +3279,7 @@
             <a:fld id="{C99BBB17-2D1A-4F24-B9AD-CEA35EC18396}" type="datetimeFigureOut">
               <a:rPr lang="en-US" smtClean="0"/>
               <a:pPr/>
-              <a:t>1/22/2024</a:t>
+              <a:t>9/20/2024</a:t>
             </a:fld>
             <a:endParaRPr lang="en-US" dirty="0"/>
           </a:p>
@@ -4527,199 +4527,6 @@
           </a:p>
         </p:txBody>
       </p:sp>
-      <p:grpSp>
-        <p:nvGrpSpPr>
-          <p:cNvPr id="23" name="Group 22">
-            <a:extLst>
-              <a:ext uri="{FF2B5EF4-FFF2-40B4-BE49-F238E27FC236}">
-                <a16:creationId xmlns:a16="http://schemas.microsoft.com/office/drawing/2014/main" id="{5C8CC107-8B6F-2BA8-A951-E8276E1CAFC8}"/>
-              </a:ext>
-            </a:extLst>
-          </p:cNvPr>
-          <p:cNvGrpSpPr/>
-          <p:nvPr/>
-        </p:nvGrpSpPr>
-        <p:grpSpPr>
-          <a:xfrm>
-            <a:off x="42671" y="6443508"/>
-            <a:ext cx="12006913" cy="385818"/>
-            <a:chOff x="42671" y="6443508"/>
-            <a:chExt cx="12006913" cy="385818"/>
-          </a:xfrm>
-        </p:grpSpPr>
-        <p:sp>
-          <p:nvSpPr>
-            <p:cNvPr id="24" name="TextBox 23">
-              <a:extLst>
-                <a:ext uri="{FF2B5EF4-FFF2-40B4-BE49-F238E27FC236}">
-                  <a16:creationId xmlns:a16="http://schemas.microsoft.com/office/drawing/2014/main" id="{1B538703-361B-3F8B-537E-BBCFEBB6CACC}"/>
-                </a:ext>
-              </a:extLst>
-            </p:cNvPr>
-            <p:cNvSpPr txBox="1"/>
-            <p:nvPr/>
-          </p:nvSpPr>
-          <p:spPr>
-            <a:xfrm>
-              <a:off x="854075" y="6521549"/>
-              <a:ext cx="3805382" cy="307777"/>
-            </a:xfrm>
-            <a:prstGeom prst="rect">
-              <a:avLst/>
-            </a:prstGeom>
-            <a:noFill/>
-          </p:spPr>
-          <p:txBody>
-            <a:bodyPr wrap="square" rtlCol="0">
-              <a:spAutoFit/>
-            </a:bodyPr>
-            <a:lstStyle/>
-            <a:p>
-              <a:r>
-                <a:rPr lang="nb-NO" sz="1400" i="1" dirty="0">
-                  <a:latin typeface="Arial" panose="020B0604020202020204" pitchFamily="34" charset="0"/>
-                  <a:cs typeface="Arial" panose="020B0604020202020204" pitchFamily="34" charset="0"/>
-                </a:rPr>
-                <a:t>FAIR digital documentation &amp; teaching</a:t>
-              </a:r>
-              <a:endParaRPr lang="en-US" sz="1400" i="1" dirty="0">
-                <a:latin typeface="Arial" panose="020B0604020202020204" pitchFamily="34" charset="0"/>
-                <a:cs typeface="Arial" panose="020B0604020202020204" pitchFamily="34" charset="0"/>
-              </a:endParaRPr>
-            </a:p>
-          </p:txBody>
-        </p:sp>
-        <p:pic>
-          <p:nvPicPr>
-            <p:cNvPr id="25" name="Picture 24" descr="A screenshot of a video game&#10;&#10;Description automatically generated">
-              <a:extLst>
-                <a:ext uri="{FF2B5EF4-FFF2-40B4-BE49-F238E27FC236}">
-                  <a16:creationId xmlns:a16="http://schemas.microsoft.com/office/drawing/2014/main" id="{5F21D3D7-314B-1C6E-B50E-93CFE61D5082}"/>
-                </a:ext>
-              </a:extLst>
-            </p:cNvPr>
-            <p:cNvPicPr>
-              <a:picLocks noChangeAspect="1"/>
-            </p:cNvPicPr>
-            <p:nvPr/>
-          </p:nvPicPr>
-          <p:blipFill>
-            <a:blip r:embed="rId2">
-              <a:extLst>
-                <a:ext uri="{28A0092B-C50C-407E-A947-70E740481C1C}">
-                  <a14:useLocalDpi xmlns:a14="http://schemas.microsoft.com/office/drawing/2010/main" val="0"/>
-                </a:ext>
-              </a:extLst>
-            </a:blip>
-            <a:stretch>
-              <a:fillRect/>
-            </a:stretch>
-          </p:blipFill>
-          <p:spPr>
-            <a:xfrm>
-              <a:off x="42671" y="6563571"/>
-              <a:ext cx="876716" cy="230005"/>
-            </a:xfrm>
-            <a:prstGeom prst="rect">
-              <a:avLst/>
-            </a:prstGeom>
-          </p:spPr>
-        </p:pic>
-        <p:pic>
-          <p:nvPicPr>
-            <p:cNvPr id="26" name="Picture 2" descr="UNIS - The university centre in Svalbard">
-              <a:extLst>
-                <a:ext uri="{FF2B5EF4-FFF2-40B4-BE49-F238E27FC236}">
-                  <a16:creationId xmlns:a16="http://schemas.microsoft.com/office/drawing/2014/main" id="{3FBB4A11-E9C3-D45E-8EDE-6CF34C32E59B}"/>
-                </a:ext>
-              </a:extLst>
-            </p:cNvPr>
-            <p:cNvPicPr>
-              <a:picLocks noChangeAspect="1" noChangeArrowheads="1"/>
-            </p:cNvPicPr>
-            <p:nvPr/>
-          </p:nvPicPr>
-          <p:blipFill>
-            <a:blip r:embed="rId3">
-              <a:extLst>
-                <a:ext uri="{28A0092B-C50C-407E-A947-70E740481C1C}">
-                  <a14:useLocalDpi xmlns:a14="http://schemas.microsoft.com/office/drawing/2010/main" val="0"/>
-                </a:ext>
-              </a:extLst>
-            </a:blip>
-            <a:srcRect/>
-            <a:stretch>
-              <a:fillRect/>
-            </a:stretch>
-          </p:blipFill>
-          <p:spPr bwMode="auto">
-            <a:xfrm>
-              <a:off x="10413848" y="6443508"/>
-              <a:ext cx="1210145" cy="326740"/>
-            </a:xfrm>
-            <a:prstGeom prst="rect">
-              <a:avLst/>
-            </a:prstGeom>
-            <a:noFill/>
-            <a:extLst>
-              <a:ext uri="{909E8E84-426E-40DD-AFC4-6F175D3DCCD1}">
-                <a14:hiddenFill xmlns:a14="http://schemas.microsoft.com/office/drawing/2010/main">
-                  <a:solidFill>
-                    <a:srgbClr val="FFFFFF"/>
-                  </a:solidFill>
-                </a14:hiddenFill>
-              </a:ext>
-            </a:extLst>
-          </p:spPr>
-        </p:pic>
-        <p:pic>
-          <p:nvPicPr>
-            <p:cNvPr id="27" name="Picture 2" descr="Site is undergoing maintenance">
-              <a:extLst>
-                <a:ext uri="{FF2B5EF4-FFF2-40B4-BE49-F238E27FC236}">
-                  <a16:creationId xmlns:a16="http://schemas.microsoft.com/office/drawing/2014/main" id="{A9B52DA7-A2A2-0059-A038-02CDC274F002}"/>
-                </a:ext>
-              </a:extLst>
-            </p:cNvPr>
-            <p:cNvPicPr>
-              <a:picLocks noChangeAspect="1" noChangeArrowheads="1"/>
-            </p:cNvPicPr>
-            <p:nvPr/>
-          </p:nvPicPr>
-          <p:blipFill>
-            <a:blip r:embed="rId4">
-              <a:extLst>
-                <a:ext uri="{28A0092B-C50C-407E-A947-70E740481C1C}">
-                  <a14:useLocalDpi xmlns:a14="http://schemas.microsoft.com/office/drawing/2010/main" val="0"/>
-                </a:ext>
-              </a:extLst>
-            </a:blip>
-            <a:srcRect/>
-            <a:stretch>
-              <a:fillRect/>
-            </a:stretch>
-          </p:blipFill>
-          <p:spPr bwMode="auto">
-            <a:xfrm>
-              <a:off x="11766409" y="6449818"/>
-              <a:ext cx="283175" cy="326740"/>
-            </a:xfrm>
-            <a:prstGeom prst="rect">
-              <a:avLst/>
-            </a:prstGeom>
-            <a:noFill/>
-            <a:extLst>
-              <a:ext uri="{909E8E84-426E-40DD-AFC4-6F175D3DCCD1}">
-                <a14:hiddenFill xmlns:a14="http://schemas.microsoft.com/office/drawing/2010/main">
-                  <a:solidFill>
-                    <a:srgbClr val="FFFFFF"/>
-                  </a:solidFill>
-                </a14:hiddenFill>
-              </a:ext>
-            </a:extLst>
-          </p:spPr>
-        </p:pic>
-      </p:grpSp>
       <p:sp>
         <p:nvSpPr>
           <p:cNvPr id="2" name="Title 1">
@@ -4802,6 +4609,157 @@
           </a:p>
         </p:txBody>
       </p:sp>
+      <p:grpSp>
+        <p:nvGrpSpPr>
+          <p:cNvPr id="3" name="Group 2">
+            <a:extLst>
+              <a:ext uri="{FF2B5EF4-FFF2-40B4-BE49-F238E27FC236}">
+                <a16:creationId xmlns:a16="http://schemas.microsoft.com/office/drawing/2014/main" id="{070192C8-C5E3-DC75-11DE-A781646B1D82}"/>
+              </a:ext>
+            </a:extLst>
+          </p:cNvPr>
+          <p:cNvGrpSpPr/>
+          <p:nvPr/>
+        </p:nvGrpSpPr>
+        <p:grpSpPr>
+          <a:xfrm>
+            <a:off x="9704900" y="6443508"/>
+            <a:ext cx="2344684" cy="333050"/>
+            <a:chOff x="9704900" y="6443508"/>
+            <a:chExt cx="2344684" cy="333050"/>
+          </a:xfrm>
+        </p:grpSpPr>
+        <p:pic>
+          <p:nvPicPr>
+            <p:cNvPr id="11" name="Picture 2" descr="UNIS - The university centre in Svalbard">
+              <a:extLst>
+                <a:ext uri="{FF2B5EF4-FFF2-40B4-BE49-F238E27FC236}">
+                  <a16:creationId xmlns:a16="http://schemas.microsoft.com/office/drawing/2014/main" id="{1177932D-36B1-2E23-FB7A-6716626735A7}"/>
+                </a:ext>
+              </a:extLst>
+            </p:cNvPr>
+            <p:cNvPicPr>
+              <a:picLocks noChangeAspect="1" noChangeArrowheads="1"/>
+            </p:cNvPicPr>
+            <p:nvPr/>
+          </p:nvPicPr>
+          <p:blipFill>
+            <a:blip r:embed="rId2">
+              <a:extLst>
+                <a:ext uri="{28A0092B-C50C-407E-A947-70E740481C1C}">
+                  <a14:useLocalDpi xmlns:a14="http://schemas.microsoft.com/office/drawing/2010/main" val="0"/>
+                </a:ext>
+              </a:extLst>
+            </a:blip>
+            <a:srcRect/>
+            <a:stretch>
+              <a:fillRect/>
+            </a:stretch>
+          </p:blipFill>
+          <p:spPr bwMode="auto">
+            <a:xfrm>
+              <a:off x="10413848" y="6443508"/>
+              <a:ext cx="1210145" cy="326740"/>
+            </a:xfrm>
+            <a:prstGeom prst="rect">
+              <a:avLst/>
+            </a:prstGeom>
+            <a:noFill/>
+            <a:extLst>
+              <a:ext uri="{909E8E84-426E-40DD-AFC4-6F175D3DCCD1}">
+                <a14:hiddenFill xmlns:a14="http://schemas.microsoft.com/office/drawing/2010/main">
+                  <a:solidFill>
+                    <a:srgbClr val="FFFFFF"/>
+                  </a:solidFill>
+                </a14:hiddenFill>
+              </a:ext>
+            </a:extLst>
+          </p:spPr>
+        </p:pic>
+        <p:pic>
+          <p:nvPicPr>
+            <p:cNvPr id="14" name="Picture 2" descr="Site is undergoing maintenance">
+              <a:extLst>
+                <a:ext uri="{FF2B5EF4-FFF2-40B4-BE49-F238E27FC236}">
+                  <a16:creationId xmlns:a16="http://schemas.microsoft.com/office/drawing/2014/main" id="{5E5E2DB1-C9D9-50BE-7C5B-D9E904B99FAF}"/>
+                </a:ext>
+              </a:extLst>
+            </p:cNvPr>
+            <p:cNvPicPr>
+              <a:picLocks noChangeAspect="1" noChangeArrowheads="1"/>
+            </p:cNvPicPr>
+            <p:nvPr/>
+          </p:nvPicPr>
+          <p:blipFill>
+            <a:blip r:embed="rId3">
+              <a:extLst>
+                <a:ext uri="{28A0092B-C50C-407E-A947-70E740481C1C}">
+                  <a14:useLocalDpi xmlns:a14="http://schemas.microsoft.com/office/drawing/2010/main" val="0"/>
+                </a:ext>
+              </a:extLst>
+            </a:blip>
+            <a:srcRect/>
+            <a:stretch>
+              <a:fillRect/>
+            </a:stretch>
+          </p:blipFill>
+          <p:spPr bwMode="auto">
+            <a:xfrm>
+              <a:off x="11766409" y="6449818"/>
+              <a:ext cx="283175" cy="326740"/>
+            </a:xfrm>
+            <a:prstGeom prst="rect">
+              <a:avLst/>
+            </a:prstGeom>
+            <a:noFill/>
+            <a:extLst>
+              <a:ext uri="{909E8E84-426E-40DD-AFC4-6F175D3DCCD1}">
+                <a14:hiddenFill xmlns:a14="http://schemas.microsoft.com/office/drawing/2010/main">
+                  <a:solidFill>
+                    <a:srgbClr val="FFFFFF"/>
+                  </a:solidFill>
+                </a14:hiddenFill>
+              </a:ext>
+            </a:extLst>
+          </p:spPr>
+        </p:pic>
+        <p:pic>
+          <p:nvPicPr>
+            <p:cNvPr id="15" name="Picture 14" descr="A black background with grey letters and a red triangle&#10;&#10;Description automatically generated">
+              <a:extLst>
+                <a:ext uri="{FF2B5EF4-FFF2-40B4-BE49-F238E27FC236}">
+                  <a16:creationId xmlns:a16="http://schemas.microsoft.com/office/drawing/2014/main" id="{E96C472B-99EF-87E2-3574-11C5C15AC68A}"/>
+                </a:ext>
+              </a:extLst>
+            </p:cNvPr>
+            <p:cNvPicPr>
+              <a:picLocks noChangeAspect="1"/>
+            </p:cNvPicPr>
+            <p:nvPr/>
+          </p:nvPicPr>
+          <p:blipFill>
+            <a:blip r:embed="rId4">
+              <a:extLst>
+                <a:ext uri="{28A0092B-C50C-407E-A947-70E740481C1C}">
+                  <a14:useLocalDpi xmlns:a14="http://schemas.microsoft.com/office/drawing/2010/main" val="0"/>
+                </a:ext>
+              </a:extLst>
+            </a:blip>
+            <a:stretch>
+              <a:fillRect/>
+            </a:stretch>
+          </p:blipFill>
+          <p:spPr>
+            <a:xfrm>
+              <a:off x="9704900" y="6486750"/>
+              <a:ext cx="580285" cy="270414"/>
+            </a:xfrm>
+            <a:prstGeom prst="rect">
+              <a:avLst/>
+            </a:prstGeom>
+          </p:spPr>
+        </p:pic>
+      </p:grpSp>
     </p:spTree>
     <p:extLst>
       <p:ext uri="{BB962C8B-B14F-4D97-AF65-F5344CB8AC3E}">
@@ -5582,199 +5540,6 @@
           </a:p>
         </p:txBody>
       </p:sp>
-      <p:grpSp>
-        <p:nvGrpSpPr>
-          <p:cNvPr id="23" name="Group 22">
-            <a:extLst>
-              <a:ext uri="{FF2B5EF4-FFF2-40B4-BE49-F238E27FC236}">
-                <a16:creationId xmlns:a16="http://schemas.microsoft.com/office/drawing/2014/main" id="{5C8CC107-8B6F-2BA8-A951-E8276E1CAFC8}"/>
-              </a:ext>
-            </a:extLst>
-          </p:cNvPr>
-          <p:cNvGrpSpPr/>
-          <p:nvPr/>
-        </p:nvGrpSpPr>
-        <p:grpSpPr>
-          <a:xfrm>
-            <a:off x="42671" y="6443508"/>
-            <a:ext cx="12006913" cy="385818"/>
-            <a:chOff x="42671" y="6443508"/>
-            <a:chExt cx="12006913" cy="385818"/>
-          </a:xfrm>
-        </p:grpSpPr>
-        <p:sp>
-          <p:nvSpPr>
-            <p:cNvPr id="24" name="TextBox 23">
-              <a:extLst>
-                <a:ext uri="{FF2B5EF4-FFF2-40B4-BE49-F238E27FC236}">
-                  <a16:creationId xmlns:a16="http://schemas.microsoft.com/office/drawing/2014/main" id="{1B538703-361B-3F8B-537E-BBCFEBB6CACC}"/>
-                </a:ext>
-              </a:extLst>
-            </p:cNvPr>
-            <p:cNvSpPr txBox="1"/>
-            <p:nvPr/>
-          </p:nvSpPr>
-          <p:spPr>
-            <a:xfrm>
-              <a:off x="854075" y="6521549"/>
-              <a:ext cx="3805382" cy="307777"/>
-            </a:xfrm>
-            <a:prstGeom prst="rect">
-              <a:avLst/>
-            </a:prstGeom>
-            <a:noFill/>
-          </p:spPr>
-          <p:txBody>
-            <a:bodyPr wrap="square" rtlCol="0">
-              <a:spAutoFit/>
-            </a:bodyPr>
-            <a:lstStyle/>
-            <a:p>
-              <a:r>
-                <a:rPr lang="nb-NO" sz="1400" i="1" dirty="0">
-                  <a:latin typeface="Arial" panose="020B0604020202020204" pitchFamily="34" charset="0"/>
-                  <a:cs typeface="Arial" panose="020B0604020202020204" pitchFamily="34" charset="0"/>
-                </a:rPr>
-                <a:t>FAIR digital documentation &amp; teaching</a:t>
-              </a:r>
-              <a:endParaRPr lang="en-US" sz="1400" i="1" dirty="0">
-                <a:latin typeface="Arial" panose="020B0604020202020204" pitchFamily="34" charset="0"/>
-                <a:cs typeface="Arial" panose="020B0604020202020204" pitchFamily="34" charset="0"/>
-              </a:endParaRPr>
-            </a:p>
-          </p:txBody>
-        </p:sp>
-        <p:pic>
-          <p:nvPicPr>
-            <p:cNvPr id="25" name="Picture 24" descr="A screenshot of a video game&#10;&#10;Description automatically generated">
-              <a:extLst>
-                <a:ext uri="{FF2B5EF4-FFF2-40B4-BE49-F238E27FC236}">
-                  <a16:creationId xmlns:a16="http://schemas.microsoft.com/office/drawing/2014/main" id="{5F21D3D7-314B-1C6E-B50E-93CFE61D5082}"/>
-                </a:ext>
-              </a:extLst>
-            </p:cNvPr>
-            <p:cNvPicPr>
-              <a:picLocks noChangeAspect="1"/>
-            </p:cNvPicPr>
-            <p:nvPr/>
-          </p:nvPicPr>
-          <p:blipFill>
-            <a:blip r:embed="rId2">
-              <a:extLst>
-                <a:ext uri="{28A0092B-C50C-407E-A947-70E740481C1C}">
-                  <a14:useLocalDpi xmlns:a14="http://schemas.microsoft.com/office/drawing/2010/main" val="0"/>
-                </a:ext>
-              </a:extLst>
-            </a:blip>
-            <a:stretch>
-              <a:fillRect/>
-            </a:stretch>
-          </p:blipFill>
-          <p:spPr>
-            <a:xfrm>
-              <a:off x="42671" y="6563571"/>
-              <a:ext cx="876716" cy="230005"/>
-            </a:xfrm>
-            <a:prstGeom prst="rect">
-              <a:avLst/>
-            </a:prstGeom>
-          </p:spPr>
-        </p:pic>
-        <p:pic>
-          <p:nvPicPr>
-            <p:cNvPr id="26" name="Picture 2" descr="UNIS - The university centre in Svalbard">
-              <a:extLst>
-                <a:ext uri="{FF2B5EF4-FFF2-40B4-BE49-F238E27FC236}">
-                  <a16:creationId xmlns:a16="http://schemas.microsoft.com/office/drawing/2014/main" id="{3FBB4A11-E9C3-D45E-8EDE-6CF34C32E59B}"/>
-                </a:ext>
-              </a:extLst>
-            </p:cNvPr>
-            <p:cNvPicPr>
-              <a:picLocks noChangeAspect="1" noChangeArrowheads="1"/>
-            </p:cNvPicPr>
-            <p:nvPr/>
-          </p:nvPicPr>
-          <p:blipFill>
-            <a:blip r:embed="rId3">
-              <a:extLst>
-                <a:ext uri="{28A0092B-C50C-407E-A947-70E740481C1C}">
-                  <a14:useLocalDpi xmlns:a14="http://schemas.microsoft.com/office/drawing/2010/main" val="0"/>
-                </a:ext>
-              </a:extLst>
-            </a:blip>
-            <a:srcRect/>
-            <a:stretch>
-              <a:fillRect/>
-            </a:stretch>
-          </p:blipFill>
-          <p:spPr bwMode="auto">
-            <a:xfrm>
-              <a:off x="10413848" y="6443508"/>
-              <a:ext cx="1210145" cy="326740"/>
-            </a:xfrm>
-            <a:prstGeom prst="rect">
-              <a:avLst/>
-            </a:prstGeom>
-            <a:noFill/>
-            <a:extLst>
-              <a:ext uri="{909E8E84-426E-40DD-AFC4-6F175D3DCCD1}">
-                <a14:hiddenFill xmlns:a14="http://schemas.microsoft.com/office/drawing/2010/main">
-                  <a:solidFill>
-                    <a:srgbClr val="FFFFFF"/>
-                  </a:solidFill>
-                </a14:hiddenFill>
-              </a:ext>
-            </a:extLst>
-          </p:spPr>
-        </p:pic>
-        <p:pic>
-          <p:nvPicPr>
-            <p:cNvPr id="27" name="Picture 2" descr="Site is undergoing maintenance">
-              <a:extLst>
-                <a:ext uri="{FF2B5EF4-FFF2-40B4-BE49-F238E27FC236}">
-                  <a16:creationId xmlns:a16="http://schemas.microsoft.com/office/drawing/2014/main" id="{A9B52DA7-A2A2-0059-A038-02CDC274F002}"/>
-                </a:ext>
-              </a:extLst>
-            </p:cNvPr>
-            <p:cNvPicPr>
-              <a:picLocks noChangeAspect="1" noChangeArrowheads="1"/>
-            </p:cNvPicPr>
-            <p:nvPr/>
-          </p:nvPicPr>
-          <p:blipFill>
-            <a:blip r:embed="rId4">
-              <a:extLst>
-                <a:ext uri="{28A0092B-C50C-407E-A947-70E740481C1C}">
-                  <a14:useLocalDpi xmlns:a14="http://schemas.microsoft.com/office/drawing/2010/main" val="0"/>
-                </a:ext>
-              </a:extLst>
-            </a:blip>
-            <a:srcRect/>
-            <a:stretch>
-              <a:fillRect/>
-            </a:stretch>
-          </p:blipFill>
-          <p:spPr bwMode="auto">
-            <a:xfrm>
-              <a:off x="11766409" y="6449818"/>
-              <a:ext cx="283175" cy="326740"/>
-            </a:xfrm>
-            <a:prstGeom prst="rect">
-              <a:avLst/>
-            </a:prstGeom>
-            <a:noFill/>
-            <a:extLst>
-              <a:ext uri="{909E8E84-426E-40DD-AFC4-6F175D3DCCD1}">
-                <a14:hiddenFill xmlns:a14="http://schemas.microsoft.com/office/drawing/2010/main">
-                  <a:solidFill>
-                    <a:srgbClr val="FFFFFF"/>
-                  </a:solidFill>
-                </a14:hiddenFill>
-              </a:ext>
-            </a:extLst>
-          </p:spPr>
-        </p:pic>
-      </p:grpSp>
       <p:sp>
         <p:nvSpPr>
           <p:cNvPr id="2" name="Title 1">
@@ -5805,7 +5570,7 @@
           <a:p>
             <a:r>
               <a:rPr lang="nb-NO" sz="3600" dirty="0"/>
-              <a:t>AG-222: spring 2024 lecture series</a:t>
+              <a:t>AG-214: autumn 2024 lecture series</a:t>
             </a:r>
             <a:endParaRPr lang="en-US" sz="3600" dirty="0"/>
           </a:p>
@@ -5841,7 +5606,7 @@
           <a:p>
             <a:r>
               <a:rPr lang="nb-NO" sz="2800" dirty="0"/>
-              <a:t>4.5/5 days of lectures and hands-on practicals – «Learning by doing»</a:t>
+              <a:t>3 days of lectures and hands-on practicals – «Learning by doing»</a:t>
             </a:r>
           </a:p>
           <a:p>
@@ -5854,7 +5619,7 @@
             </a:r>
             <a:r>
               <a:rPr lang="nb-NO" dirty="0">
-                <a:hlinkClick r:id="rId5"/>
+                <a:hlinkClick r:id="rId2"/>
               </a:rPr>
               <a:t>https://unisvalbard.github.io/ebooks/</a:t>
             </a:r>
@@ -5870,7 +5635,7 @@
             </a:r>
             <a:r>
               <a:rPr lang="nb-NO" sz="2800" dirty="0">
-                <a:hlinkClick r:id="rId6"/>
+                <a:hlinkClick r:id="rId3"/>
               </a:rPr>
               <a:t>https://unisvalbard.github.io/Geo-SfM/</a:t>
             </a:r>
@@ -5878,15 +5643,6 @@
           </a:p>
           <a:p>
             <a:endParaRPr lang="nb-NO" dirty="0"/>
-          </a:p>
-          <a:p>
-            <a:pPr marL="0" indent="0">
-              <a:buNone/>
-            </a:pPr>
-            <a:endParaRPr lang="nb-NO" sz="2800" dirty="0"/>
-          </a:p>
-          <a:p>
-            <a:endParaRPr lang="nb-NO" sz="2800" dirty="0"/>
           </a:p>
           <a:p>
             <a:pPr marL="0" indent="0">
@@ -5911,7 +5667,7 @@
           <p:nvPr/>
         </p:nvPicPr>
         <p:blipFill rotWithShape="1">
-          <a:blip r:embed="rId7">
+          <a:blip r:embed="rId4">
             <a:extLst>
               <a:ext uri="{28A0092B-C50C-407E-A947-70E740481C1C}">
                 <a14:useLocalDpi xmlns:a14="http://schemas.microsoft.com/office/drawing/2010/main" val="0"/>
@@ -5955,8 +5711,8 @@
         </p:nvSpPr>
         <p:spPr>
           <a:xfrm>
-            <a:off x="9120133" y="2444912"/>
-            <a:ext cx="2121093" cy="923330"/>
+            <a:off x="9203489" y="2228671"/>
+            <a:ext cx="1954381" cy="1107996"/>
           </a:xfrm>
           <a:prstGeom prst="rect">
             <a:avLst/>
@@ -5992,11 +5748,171 @@
               <a:rPr lang="en-US" dirty="0">
                 <a:latin typeface="Arial" panose="020B0604020202020204" pitchFamily="34" charset="0"/>
               </a:rPr>
+              <a:t>NGI: 2024 - ???</a:t>
+            </a:r>
+          </a:p>
+          <a:p>
+            <a:pPr algn="ctr"/>
+            <a:r>
+              <a:rPr lang="en-US" sz="1100" dirty="0">
+                <a:latin typeface="Arial" panose="020B0604020202020204" pitchFamily="34" charset="0"/>
+              </a:rPr>
               <a:t>(UNIS: 2016-2024)</a:t>
             </a:r>
           </a:p>
         </p:txBody>
       </p:sp>
+      <p:grpSp>
+        <p:nvGrpSpPr>
+          <p:cNvPr id="16" name="Group 15">
+            <a:extLst>
+              <a:ext uri="{FF2B5EF4-FFF2-40B4-BE49-F238E27FC236}">
+                <a16:creationId xmlns:a16="http://schemas.microsoft.com/office/drawing/2014/main" id="{8762CCD0-FED5-8F25-CC96-DCBDAB5A6172}"/>
+              </a:ext>
+            </a:extLst>
+          </p:cNvPr>
+          <p:cNvGrpSpPr/>
+          <p:nvPr/>
+        </p:nvGrpSpPr>
+        <p:grpSpPr>
+          <a:xfrm>
+            <a:off x="9704900" y="6435344"/>
+            <a:ext cx="2344684" cy="333050"/>
+            <a:chOff x="9704900" y="6443508"/>
+            <a:chExt cx="2344684" cy="333050"/>
+          </a:xfrm>
+        </p:grpSpPr>
+        <p:pic>
+          <p:nvPicPr>
+            <p:cNvPr id="26" name="Picture 2" descr="UNIS - The university centre in Svalbard">
+              <a:extLst>
+                <a:ext uri="{FF2B5EF4-FFF2-40B4-BE49-F238E27FC236}">
+                  <a16:creationId xmlns:a16="http://schemas.microsoft.com/office/drawing/2014/main" id="{3FBB4A11-E9C3-D45E-8EDE-6CF34C32E59B}"/>
+                </a:ext>
+              </a:extLst>
+            </p:cNvPr>
+            <p:cNvPicPr>
+              <a:picLocks noChangeAspect="1" noChangeArrowheads="1"/>
+            </p:cNvPicPr>
+            <p:nvPr/>
+          </p:nvPicPr>
+          <p:blipFill>
+            <a:blip r:embed="rId5">
+              <a:extLst>
+                <a:ext uri="{28A0092B-C50C-407E-A947-70E740481C1C}">
+                  <a14:useLocalDpi xmlns:a14="http://schemas.microsoft.com/office/drawing/2010/main" val="0"/>
+                </a:ext>
+              </a:extLst>
+            </a:blip>
+            <a:srcRect/>
+            <a:stretch>
+              <a:fillRect/>
+            </a:stretch>
+          </p:blipFill>
+          <p:spPr bwMode="auto">
+            <a:xfrm>
+              <a:off x="10413848" y="6443508"/>
+              <a:ext cx="1210145" cy="326740"/>
+            </a:xfrm>
+            <a:prstGeom prst="rect">
+              <a:avLst/>
+            </a:prstGeom>
+            <a:noFill/>
+            <a:extLst>
+              <a:ext uri="{909E8E84-426E-40DD-AFC4-6F175D3DCCD1}">
+                <a14:hiddenFill xmlns:a14="http://schemas.microsoft.com/office/drawing/2010/main">
+                  <a:solidFill>
+                    <a:srgbClr val="FFFFFF"/>
+                  </a:solidFill>
+                </a14:hiddenFill>
+              </a:ext>
+            </a:extLst>
+          </p:spPr>
+        </p:pic>
+        <p:pic>
+          <p:nvPicPr>
+            <p:cNvPr id="27" name="Picture 2" descr="Site is undergoing maintenance">
+              <a:extLst>
+                <a:ext uri="{FF2B5EF4-FFF2-40B4-BE49-F238E27FC236}">
+                  <a16:creationId xmlns:a16="http://schemas.microsoft.com/office/drawing/2014/main" id="{A9B52DA7-A2A2-0059-A038-02CDC274F002}"/>
+                </a:ext>
+              </a:extLst>
+            </p:cNvPr>
+            <p:cNvPicPr>
+              <a:picLocks noChangeAspect="1" noChangeArrowheads="1"/>
+            </p:cNvPicPr>
+            <p:nvPr/>
+          </p:nvPicPr>
+          <p:blipFill>
+            <a:blip r:embed="rId6">
+              <a:extLst>
+                <a:ext uri="{28A0092B-C50C-407E-A947-70E740481C1C}">
+                  <a14:useLocalDpi xmlns:a14="http://schemas.microsoft.com/office/drawing/2010/main" val="0"/>
+                </a:ext>
+              </a:extLst>
+            </a:blip>
+            <a:srcRect/>
+            <a:stretch>
+              <a:fillRect/>
+            </a:stretch>
+          </p:blipFill>
+          <p:spPr bwMode="auto">
+            <a:xfrm>
+              <a:off x="11766409" y="6449818"/>
+              <a:ext cx="283175" cy="326740"/>
+            </a:xfrm>
+            <a:prstGeom prst="rect">
+              <a:avLst/>
+            </a:prstGeom>
+            <a:noFill/>
+            <a:extLst>
+              <a:ext uri="{909E8E84-426E-40DD-AFC4-6F175D3DCCD1}">
+                <a14:hiddenFill xmlns:a14="http://schemas.microsoft.com/office/drawing/2010/main">
+                  <a:solidFill>
+                    <a:srgbClr val="FFFFFF"/>
+                  </a:solidFill>
+                </a14:hiddenFill>
+              </a:ext>
+            </a:extLst>
+          </p:spPr>
+        </p:pic>
+        <p:pic>
+          <p:nvPicPr>
+            <p:cNvPr id="15" name="Picture 14" descr="A black background with grey letters and a red triangle&#10;&#10;Description automatically generated">
+              <a:extLst>
+                <a:ext uri="{FF2B5EF4-FFF2-40B4-BE49-F238E27FC236}">
+                  <a16:creationId xmlns:a16="http://schemas.microsoft.com/office/drawing/2014/main" id="{182DAC85-A616-3DBD-D6D8-798F84AF0BF6}"/>
+                </a:ext>
+              </a:extLst>
+            </p:cNvPr>
+            <p:cNvPicPr>
+              <a:picLocks noChangeAspect="1"/>
+            </p:cNvPicPr>
+            <p:nvPr/>
+          </p:nvPicPr>
+          <p:blipFill>
+            <a:blip r:embed="rId7">
+              <a:extLst>
+                <a:ext uri="{28A0092B-C50C-407E-A947-70E740481C1C}">
+                  <a14:useLocalDpi xmlns:a14="http://schemas.microsoft.com/office/drawing/2010/main" val="0"/>
+                </a:ext>
+              </a:extLst>
+            </a:blip>
+            <a:stretch>
+              <a:fillRect/>
+            </a:stretch>
+          </p:blipFill>
+          <p:spPr>
+            <a:xfrm>
+              <a:off x="9704900" y="6486750"/>
+              <a:ext cx="580285" cy="270414"/>
+            </a:xfrm>
+            <a:prstGeom prst="rect">
+              <a:avLst/>
+            </a:prstGeom>
+          </p:spPr>
+        </p:pic>
+      </p:grpSp>
     </p:spTree>
     <p:extLst>
       <p:ext uri="{BB962C8B-B14F-4D97-AF65-F5344CB8AC3E}">
@@ -6777,12 +6693,155 @@
           </a:p>
         </p:txBody>
       </p:sp>
+      <p:sp>
+        <p:nvSpPr>
+          <p:cNvPr id="2" name="Title 1">
+            <a:extLst>
+              <a:ext uri="{FF2B5EF4-FFF2-40B4-BE49-F238E27FC236}">
+                <a16:creationId xmlns:a16="http://schemas.microsoft.com/office/drawing/2014/main" id="{044D5C86-6C13-B385-18EB-CE82554A07BC}"/>
+              </a:ext>
+            </a:extLst>
+          </p:cNvPr>
+          <p:cNvSpPr>
+            <a:spLocks noGrp="1"/>
+          </p:cNvSpPr>
+          <p:nvPr>
+            <p:ph type="title"/>
+          </p:nvPr>
+        </p:nvSpPr>
+        <p:spPr>
+          <a:xfrm>
+            <a:off x="1676400" y="-7563"/>
+            <a:ext cx="10515600" cy="1325563"/>
+          </a:xfrm>
+        </p:spPr>
+        <p:txBody>
+          <a:bodyPr>
+            <a:normAutofit/>
+          </a:bodyPr>
+          <a:lstStyle/>
+          <a:p>
+            <a:r>
+              <a:rPr lang="nb-NO" sz="3600" dirty="0"/>
+              <a:t>AG-222: Focus &amp; aims</a:t>
+            </a:r>
+            <a:endParaRPr lang="en-US" sz="3600" dirty="0"/>
+          </a:p>
+        </p:txBody>
+      </p:sp>
+      <p:sp>
+        <p:nvSpPr>
+          <p:cNvPr id="3" name="Content Placeholder 2">
+            <a:extLst>
+              <a:ext uri="{FF2B5EF4-FFF2-40B4-BE49-F238E27FC236}">
+                <a16:creationId xmlns:a16="http://schemas.microsoft.com/office/drawing/2014/main" id="{2D0EA7A2-E4A5-2799-2A25-121BD1FEE728}"/>
+              </a:ext>
+            </a:extLst>
+          </p:cNvPr>
+          <p:cNvSpPr>
+            <a:spLocks noGrp="1"/>
+          </p:cNvSpPr>
+          <p:nvPr>
+            <p:ph idx="1"/>
+          </p:nvPr>
+        </p:nvSpPr>
+        <p:spPr>
+          <a:xfrm>
+            <a:off x="838199" y="1825625"/>
+            <a:ext cx="10785793" cy="4351338"/>
+          </a:xfrm>
+        </p:spPr>
+        <p:txBody>
+          <a:bodyPr>
+            <a:normAutofit fontScale="85000" lnSpcReduction="20000"/>
+          </a:bodyPr>
+          <a:lstStyle/>
+          <a:p>
+            <a:pPr marL="0" indent="0">
+              <a:buNone/>
+            </a:pPr>
+            <a:r>
+              <a:rPr lang="nb-NO" dirty="0"/>
+              <a:t>Motivation:</a:t>
+            </a:r>
+          </a:p>
+          <a:p>
+            <a:r>
+              <a:rPr lang="nb-NO" dirty="0"/>
+              <a:t>Plan of approach for acquiring digital data sets</a:t>
+            </a:r>
+          </a:p>
+          <a:p>
+            <a:r>
+              <a:rPr lang="nb-NO" dirty="0"/>
+              <a:t>Standardised &amp; structured data processing</a:t>
+            </a:r>
+          </a:p>
+          <a:p>
+            <a:r>
+              <a:rPr lang="nb-NO" dirty="0"/>
+              <a:t>Scientific notekeeping and data availability</a:t>
+            </a:r>
+          </a:p>
+          <a:p>
+            <a:endParaRPr lang="nb-NO" dirty="0"/>
+          </a:p>
+          <a:p>
+            <a:pPr marL="0" indent="0">
+              <a:buNone/>
+            </a:pPr>
+            <a:r>
+              <a:rPr lang="nb-NO" dirty="0"/>
+              <a:t>Learning outcomes:</a:t>
+            </a:r>
+          </a:p>
+          <a:p>
+            <a:r>
+              <a:rPr lang="nb-NO" dirty="0"/>
+              <a:t>Fundamental understanding of photogrammetry, and how to process data</a:t>
+            </a:r>
+          </a:p>
+          <a:p>
+            <a:r>
+              <a:rPr lang="nb-NO" dirty="0"/>
+              <a:t>Understanding of how to apply georeferencing and spatial alignment</a:t>
+            </a:r>
+          </a:p>
+          <a:p>
+            <a:r>
+              <a:rPr lang="nb-NO" dirty="0"/>
+              <a:t>Become familiar with best-practices in data processing, including quality assessment and data validation</a:t>
+            </a:r>
+          </a:p>
+          <a:p>
+            <a:r>
+              <a:rPr lang="nb-NO" dirty="0"/>
+              <a:t>Be able to perform basic data analysis and feature interpretation</a:t>
+            </a:r>
+          </a:p>
+          <a:p>
+            <a:endParaRPr lang="nb-NO" dirty="0"/>
+          </a:p>
+          <a:p>
+            <a:endParaRPr lang="nb-NO" sz="2800" dirty="0"/>
+          </a:p>
+          <a:p>
+            <a:endParaRPr lang="nb-NO" sz="2800" dirty="0"/>
+          </a:p>
+          <a:p>
+            <a:pPr marL="0" indent="0">
+              <a:buNone/>
+            </a:pPr>
+            <a:endParaRPr lang="en-US" sz="2800" dirty="0"/>
+          </a:p>
+        </p:txBody>
+      </p:sp>
       <p:grpSp>
         <p:nvGrpSpPr>
-          <p:cNvPr id="23" name="Group 22">
-            <a:extLst>
-              <a:ext uri="{FF2B5EF4-FFF2-40B4-BE49-F238E27FC236}">
-                <a16:creationId xmlns:a16="http://schemas.microsoft.com/office/drawing/2014/main" id="{5C8CC107-8B6F-2BA8-A951-E8276E1CAFC8}"/>
+          <p:cNvPr id="11" name="Group 10">
+            <a:extLst>
+              <a:ext uri="{FF2B5EF4-FFF2-40B4-BE49-F238E27FC236}">
+                <a16:creationId xmlns:a16="http://schemas.microsoft.com/office/drawing/2014/main" id="{D7878B93-9754-40C2-67B5-4C6B44C09932}"/>
               </a:ext>
             </a:extLst>
           </p:cNvPr>
@@ -6791,65 +6850,23 @@
         </p:nvGrpSpPr>
         <p:grpSpPr>
           <a:xfrm>
-            <a:off x="42671" y="6443508"/>
-            <a:ext cx="12006913" cy="385818"/>
-            <a:chOff x="42671" y="6443508"/>
-            <a:chExt cx="12006913" cy="385818"/>
+            <a:off x="9704900" y="6443508"/>
+            <a:ext cx="2344684" cy="333050"/>
+            <a:chOff x="9704900" y="6443508"/>
+            <a:chExt cx="2344684" cy="333050"/>
           </a:xfrm>
         </p:grpSpPr>
-        <p:sp>
-          <p:nvSpPr>
-            <p:cNvPr id="24" name="TextBox 23">
+        <p:pic>
+          <p:nvPicPr>
+            <p:cNvPr id="12" name="Picture 2" descr="UNIS - The university centre in Svalbard">
               <a:extLst>
                 <a:ext uri="{FF2B5EF4-FFF2-40B4-BE49-F238E27FC236}">
-                  <a16:creationId xmlns:a16="http://schemas.microsoft.com/office/drawing/2014/main" id="{1B538703-361B-3F8B-537E-BBCFEBB6CACC}"/>
-                </a:ext>
-              </a:extLst>
-            </p:cNvPr>
-            <p:cNvSpPr txBox="1"/>
-            <p:nvPr/>
-          </p:nvSpPr>
-          <p:spPr>
-            <a:xfrm>
-              <a:off x="854075" y="6521549"/>
-              <a:ext cx="3805382" cy="307777"/>
-            </a:xfrm>
-            <a:prstGeom prst="rect">
-              <a:avLst/>
-            </a:prstGeom>
-            <a:noFill/>
-          </p:spPr>
-          <p:txBody>
-            <a:bodyPr wrap="square" rtlCol="0">
-              <a:spAutoFit/>
-            </a:bodyPr>
-            <a:lstStyle/>
-            <a:p>
-              <a:r>
-                <a:rPr lang="nb-NO" sz="1400" i="1" dirty="0">
-                  <a:latin typeface="Arial" panose="020B0604020202020204" pitchFamily="34" charset="0"/>
-                  <a:cs typeface="Arial" panose="020B0604020202020204" pitchFamily="34" charset="0"/>
-                </a:rPr>
-                <a:t>FAIR digital documentation &amp; teaching</a:t>
-              </a:r>
-              <a:endParaRPr lang="en-US" sz="1400" i="1" dirty="0">
-                <a:latin typeface="Arial" panose="020B0604020202020204" pitchFamily="34" charset="0"/>
-                <a:cs typeface="Arial" panose="020B0604020202020204" pitchFamily="34" charset="0"/>
-              </a:endParaRPr>
-            </a:p>
-          </p:txBody>
-        </p:sp>
-        <p:pic>
-          <p:nvPicPr>
-            <p:cNvPr id="25" name="Picture 24" descr="A screenshot of a video game&#10;&#10;Description automatically generated">
-              <a:extLst>
-                <a:ext uri="{FF2B5EF4-FFF2-40B4-BE49-F238E27FC236}">
-                  <a16:creationId xmlns:a16="http://schemas.microsoft.com/office/drawing/2014/main" id="{5F21D3D7-314B-1C6E-B50E-93CFE61D5082}"/>
+                  <a16:creationId xmlns:a16="http://schemas.microsoft.com/office/drawing/2014/main" id="{502E761F-10E4-1995-7CC7-8E2CD0F4F78C}"/>
                 </a:ext>
               </a:extLst>
             </p:cNvPr>
             <p:cNvPicPr>
-              <a:picLocks noChangeAspect="1"/>
+              <a:picLocks noChangeAspect="1" noChangeArrowheads="1"/>
             </p:cNvPicPr>
             <p:nvPr/>
           </p:nvPicPr>
@@ -6861,26 +6878,37 @@
                 </a:ext>
               </a:extLst>
             </a:blip>
+            <a:srcRect/>
             <a:stretch>
               <a:fillRect/>
             </a:stretch>
           </p:blipFill>
-          <p:spPr>
+          <p:spPr bwMode="auto">
             <a:xfrm>
-              <a:off x="42671" y="6563571"/>
-              <a:ext cx="876716" cy="230005"/>
+              <a:off x="10413848" y="6443508"/>
+              <a:ext cx="1210145" cy="326740"/>
             </a:xfrm>
             <a:prstGeom prst="rect">
               <a:avLst/>
             </a:prstGeom>
+            <a:noFill/>
+            <a:extLst>
+              <a:ext uri="{909E8E84-426E-40DD-AFC4-6F175D3DCCD1}">
+                <a14:hiddenFill xmlns:a14="http://schemas.microsoft.com/office/drawing/2010/main">
+                  <a:solidFill>
+                    <a:srgbClr val="FFFFFF"/>
+                  </a:solidFill>
+                </a14:hiddenFill>
+              </a:ext>
+            </a:extLst>
           </p:spPr>
         </p:pic>
         <p:pic>
           <p:nvPicPr>
-            <p:cNvPr id="26" name="Picture 2" descr="UNIS - The university centre in Svalbard">
+            <p:cNvPr id="14" name="Picture 2" descr="Site is undergoing maintenance">
               <a:extLst>
                 <a:ext uri="{FF2B5EF4-FFF2-40B4-BE49-F238E27FC236}">
-                  <a16:creationId xmlns:a16="http://schemas.microsoft.com/office/drawing/2014/main" id="{3FBB4A11-E9C3-D45E-8EDE-6CF34C32E59B}"/>
+                  <a16:creationId xmlns:a16="http://schemas.microsoft.com/office/drawing/2014/main" id="{3104184E-88A8-A108-F5E3-9A13782D2B93}"/>
                 </a:ext>
               </a:extLst>
             </p:cNvPr>
@@ -6904,8 +6932,8 @@
           </p:blipFill>
           <p:spPr bwMode="auto">
             <a:xfrm>
-              <a:off x="10413848" y="6443508"/>
-              <a:ext cx="1210145" cy="326740"/>
+              <a:off x="11766409" y="6449818"/>
+              <a:ext cx="283175" cy="326740"/>
             </a:xfrm>
             <a:prstGeom prst="rect">
               <a:avLst/>
@@ -6924,15 +6952,15 @@
         </p:pic>
         <p:pic>
           <p:nvPicPr>
-            <p:cNvPr id="27" name="Picture 2" descr="Site is undergoing maintenance">
+            <p:cNvPr id="15" name="Picture 14" descr="A black background with grey letters and a red triangle&#10;&#10;Description automatically generated">
               <a:extLst>
                 <a:ext uri="{FF2B5EF4-FFF2-40B4-BE49-F238E27FC236}">
-                  <a16:creationId xmlns:a16="http://schemas.microsoft.com/office/drawing/2014/main" id="{A9B52DA7-A2A2-0059-A038-02CDC274F002}"/>
+                  <a16:creationId xmlns:a16="http://schemas.microsoft.com/office/drawing/2014/main" id="{32CD27B1-17FB-17FD-5597-F00EA27562F1}"/>
                 </a:ext>
               </a:extLst>
             </p:cNvPr>
             <p:cNvPicPr>
-              <a:picLocks noChangeAspect="1" noChangeArrowheads="1"/>
+              <a:picLocks noChangeAspect="1"/>
             </p:cNvPicPr>
             <p:nvPr/>
           </p:nvPicPr>
@@ -6944,175 +6972,21 @@
                 </a:ext>
               </a:extLst>
             </a:blip>
-            <a:srcRect/>
             <a:stretch>
               <a:fillRect/>
             </a:stretch>
           </p:blipFill>
-          <p:spPr bwMode="auto">
+          <p:spPr>
             <a:xfrm>
-              <a:off x="11766409" y="6449818"/>
-              <a:ext cx="283175" cy="326740"/>
+              <a:off x="9704900" y="6486750"/>
+              <a:ext cx="580285" cy="270414"/>
             </a:xfrm>
             <a:prstGeom prst="rect">
               <a:avLst/>
             </a:prstGeom>
-            <a:noFill/>
-            <a:extLst>
-              <a:ext uri="{909E8E84-426E-40DD-AFC4-6F175D3DCCD1}">
-                <a14:hiddenFill xmlns:a14="http://schemas.microsoft.com/office/drawing/2010/main">
-                  <a:solidFill>
-                    <a:srgbClr val="FFFFFF"/>
-                  </a:solidFill>
-                </a14:hiddenFill>
-              </a:ext>
-            </a:extLst>
           </p:spPr>
         </p:pic>
       </p:grpSp>
-      <p:sp>
-        <p:nvSpPr>
-          <p:cNvPr id="2" name="Title 1">
-            <a:extLst>
-              <a:ext uri="{FF2B5EF4-FFF2-40B4-BE49-F238E27FC236}">
-                <a16:creationId xmlns:a16="http://schemas.microsoft.com/office/drawing/2014/main" id="{044D5C86-6C13-B385-18EB-CE82554A07BC}"/>
-              </a:ext>
-            </a:extLst>
-          </p:cNvPr>
-          <p:cNvSpPr>
-            <a:spLocks noGrp="1"/>
-          </p:cNvSpPr>
-          <p:nvPr>
-            <p:ph type="title"/>
-          </p:nvPr>
-        </p:nvSpPr>
-        <p:spPr>
-          <a:xfrm>
-            <a:off x="1676400" y="-7563"/>
-            <a:ext cx="10515600" cy="1325563"/>
-          </a:xfrm>
-        </p:spPr>
-        <p:txBody>
-          <a:bodyPr>
-            <a:normAutofit/>
-          </a:bodyPr>
-          <a:lstStyle/>
-          <a:p>
-            <a:r>
-              <a:rPr lang="nb-NO" sz="3600" dirty="0"/>
-              <a:t>AG-222: Focus &amp; aims</a:t>
-            </a:r>
-            <a:endParaRPr lang="en-US" sz="3600" dirty="0"/>
-          </a:p>
-        </p:txBody>
-      </p:sp>
-      <p:sp>
-        <p:nvSpPr>
-          <p:cNvPr id="3" name="Content Placeholder 2">
-            <a:extLst>
-              <a:ext uri="{FF2B5EF4-FFF2-40B4-BE49-F238E27FC236}">
-                <a16:creationId xmlns:a16="http://schemas.microsoft.com/office/drawing/2014/main" id="{2D0EA7A2-E4A5-2799-2A25-121BD1FEE728}"/>
-              </a:ext>
-            </a:extLst>
-          </p:cNvPr>
-          <p:cNvSpPr>
-            <a:spLocks noGrp="1"/>
-          </p:cNvSpPr>
-          <p:nvPr>
-            <p:ph idx="1"/>
-          </p:nvPr>
-        </p:nvSpPr>
-        <p:spPr>
-          <a:xfrm>
-            <a:off x="838199" y="1825625"/>
-            <a:ext cx="10785793" cy="4351338"/>
-          </a:xfrm>
-        </p:spPr>
-        <p:txBody>
-          <a:bodyPr>
-            <a:normAutofit fontScale="85000" lnSpcReduction="20000"/>
-          </a:bodyPr>
-          <a:lstStyle/>
-          <a:p>
-            <a:pPr marL="0" indent="0">
-              <a:buNone/>
-            </a:pPr>
-            <a:r>
-              <a:rPr lang="nb-NO" dirty="0"/>
-              <a:t>Motivation:</a:t>
-            </a:r>
-          </a:p>
-          <a:p>
-            <a:r>
-              <a:rPr lang="nb-NO" dirty="0"/>
-              <a:t>Plan of approach for acquiring digital data sets</a:t>
-            </a:r>
-          </a:p>
-          <a:p>
-            <a:r>
-              <a:rPr lang="nb-NO" dirty="0"/>
-              <a:t>Standardised &amp; structured data processing</a:t>
-            </a:r>
-          </a:p>
-          <a:p>
-            <a:r>
-              <a:rPr lang="nb-NO" dirty="0"/>
-              <a:t>Scientific notekeeping and data availability</a:t>
-            </a:r>
-          </a:p>
-          <a:p>
-            <a:endParaRPr lang="nb-NO" dirty="0"/>
-          </a:p>
-          <a:p>
-            <a:pPr marL="0" indent="0">
-              <a:buNone/>
-            </a:pPr>
-            <a:r>
-              <a:rPr lang="nb-NO" dirty="0"/>
-              <a:t>Learning outcomes:</a:t>
-            </a:r>
-          </a:p>
-          <a:p>
-            <a:r>
-              <a:rPr lang="nb-NO" dirty="0"/>
-              <a:t>Fundamental understanding of photogrammetry, and how to process data</a:t>
-            </a:r>
-          </a:p>
-          <a:p>
-            <a:r>
-              <a:rPr lang="nb-NO" dirty="0"/>
-              <a:t>Understanding of how to apply georeferencing and spatial alignment</a:t>
-            </a:r>
-          </a:p>
-          <a:p>
-            <a:r>
-              <a:rPr lang="nb-NO" dirty="0"/>
-              <a:t>Become familiar with best-practices in data processing, including quality assessment and data validation</a:t>
-            </a:r>
-          </a:p>
-          <a:p>
-            <a:r>
-              <a:rPr lang="nb-NO" dirty="0"/>
-              <a:t>Be able to perform basic data analysis and feature interpretation</a:t>
-            </a:r>
-          </a:p>
-          <a:p>
-            <a:endParaRPr lang="nb-NO" dirty="0"/>
-          </a:p>
-          <a:p>
-            <a:endParaRPr lang="nb-NO" sz="2800" dirty="0"/>
-          </a:p>
-          <a:p>
-            <a:endParaRPr lang="nb-NO" sz="2800" dirty="0"/>
-          </a:p>
-          <a:p>
-            <a:pPr marL="0" indent="0">
-              <a:buNone/>
-            </a:pPr>
-            <a:endParaRPr lang="en-US" sz="2800" dirty="0"/>
-          </a:p>
-        </p:txBody>
-      </p:sp>
     </p:spTree>
     <p:extLst>
       <p:ext uri="{BB962C8B-B14F-4D97-AF65-F5344CB8AC3E}">
@@ -7893,199 +7767,6 @@
           </a:p>
         </p:txBody>
       </p:sp>
-      <p:grpSp>
-        <p:nvGrpSpPr>
-          <p:cNvPr id="23" name="Group 22">
-            <a:extLst>
-              <a:ext uri="{FF2B5EF4-FFF2-40B4-BE49-F238E27FC236}">
-                <a16:creationId xmlns:a16="http://schemas.microsoft.com/office/drawing/2014/main" id="{5C8CC107-8B6F-2BA8-A951-E8276E1CAFC8}"/>
-              </a:ext>
-            </a:extLst>
-          </p:cNvPr>
-          <p:cNvGrpSpPr/>
-          <p:nvPr/>
-        </p:nvGrpSpPr>
-        <p:grpSpPr>
-          <a:xfrm>
-            <a:off x="42671" y="6443508"/>
-            <a:ext cx="12006913" cy="385818"/>
-            <a:chOff x="42671" y="6443508"/>
-            <a:chExt cx="12006913" cy="385818"/>
-          </a:xfrm>
-        </p:grpSpPr>
-        <p:sp>
-          <p:nvSpPr>
-            <p:cNvPr id="24" name="TextBox 23">
-              <a:extLst>
-                <a:ext uri="{FF2B5EF4-FFF2-40B4-BE49-F238E27FC236}">
-                  <a16:creationId xmlns:a16="http://schemas.microsoft.com/office/drawing/2014/main" id="{1B538703-361B-3F8B-537E-BBCFEBB6CACC}"/>
-                </a:ext>
-              </a:extLst>
-            </p:cNvPr>
-            <p:cNvSpPr txBox="1"/>
-            <p:nvPr/>
-          </p:nvSpPr>
-          <p:spPr>
-            <a:xfrm>
-              <a:off x="854075" y="6521549"/>
-              <a:ext cx="3805382" cy="307777"/>
-            </a:xfrm>
-            <a:prstGeom prst="rect">
-              <a:avLst/>
-            </a:prstGeom>
-            <a:noFill/>
-          </p:spPr>
-          <p:txBody>
-            <a:bodyPr wrap="square" rtlCol="0">
-              <a:spAutoFit/>
-            </a:bodyPr>
-            <a:lstStyle/>
-            <a:p>
-              <a:r>
-                <a:rPr lang="nb-NO" sz="1400" i="1" dirty="0">
-                  <a:latin typeface="Arial" panose="020B0604020202020204" pitchFamily="34" charset="0"/>
-                  <a:cs typeface="Arial" panose="020B0604020202020204" pitchFamily="34" charset="0"/>
-                </a:rPr>
-                <a:t>FAIR digital documentation &amp; teaching</a:t>
-              </a:r>
-              <a:endParaRPr lang="en-US" sz="1400" i="1" dirty="0">
-                <a:latin typeface="Arial" panose="020B0604020202020204" pitchFamily="34" charset="0"/>
-                <a:cs typeface="Arial" panose="020B0604020202020204" pitchFamily="34" charset="0"/>
-              </a:endParaRPr>
-            </a:p>
-          </p:txBody>
-        </p:sp>
-        <p:pic>
-          <p:nvPicPr>
-            <p:cNvPr id="25" name="Picture 24" descr="A screenshot of a video game&#10;&#10;Description automatically generated">
-              <a:extLst>
-                <a:ext uri="{FF2B5EF4-FFF2-40B4-BE49-F238E27FC236}">
-                  <a16:creationId xmlns:a16="http://schemas.microsoft.com/office/drawing/2014/main" id="{5F21D3D7-314B-1C6E-B50E-93CFE61D5082}"/>
-                </a:ext>
-              </a:extLst>
-            </p:cNvPr>
-            <p:cNvPicPr>
-              <a:picLocks noChangeAspect="1"/>
-            </p:cNvPicPr>
-            <p:nvPr/>
-          </p:nvPicPr>
-          <p:blipFill>
-            <a:blip r:embed="rId2">
-              <a:extLst>
-                <a:ext uri="{28A0092B-C50C-407E-A947-70E740481C1C}">
-                  <a14:useLocalDpi xmlns:a14="http://schemas.microsoft.com/office/drawing/2010/main" val="0"/>
-                </a:ext>
-              </a:extLst>
-            </a:blip>
-            <a:stretch>
-              <a:fillRect/>
-            </a:stretch>
-          </p:blipFill>
-          <p:spPr>
-            <a:xfrm>
-              <a:off x="42671" y="6563571"/>
-              <a:ext cx="876716" cy="230005"/>
-            </a:xfrm>
-            <a:prstGeom prst="rect">
-              <a:avLst/>
-            </a:prstGeom>
-          </p:spPr>
-        </p:pic>
-        <p:pic>
-          <p:nvPicPr>
-            <p:cNvPr id="26" name="Picture 2" descr="UNIS - The university centre in Svalbard">
-              <a:extLst>
-                <a:ext uri="{FF2B5EF4-FFF2-40B4-BE49-F238E27FC236}">
-                  <a16:creationId xmlns:a16="http://schemas.microsoft.com/office/drawing/2014/main" id="{3FBB4A11-E9C3-D45E-8EDE-6CF34C32E59B}"/>
-                </a:ext>
-              </a:extLst>
-            </p:cNvPr>
-            <p:cNvPicPr>
-              <a:picLocks noChangeAspect="1" noChangeArrowheads="1"/>
-            </p:cNvPicPr>
-            <p:nvPr/>
-          </p:nvPicPr>
-          <p:blipFill>
-            <a:blip r:embed="rId3">
-              <a:extLst>
-                <a:ext uri="{28A0092B-C50C-407E-A947-70E740481C1C}">
-                  <a14:useLocalDpi xmlns:a14="http://schemas.microsoft.com/office/drawing/2010/main" val="0"/>
-                </a:ext>
-              </a:extLst>
-            </a:blip>
-            <a:srcRect/>
-            <a:stretch>
-              <a:fillRect/>
-            </a:stretch>
-          </p:blipFill>
-          <p:spPr bwMode="auto">
-            <a:xfrm>
-              <a:off x="10413848" y="6443508"/>
-              <a:ext cx="1210145" cy="326740"/>
-            </a:xfrm>
-            <a:prstGeom prst="rect">
-              <a:avLst/>
-            </a:prstGeom>
-            <a:noFill/>
-            <a:extLst>
-              <a:ext uri="{909E8E84-426E-40DD-AFC4-6F175D3DCCD1}">
-                <a14:hiddenFill xmlns:a14="http://schemas.microsoft.com/office/drawing/2010/main">
-                  <a:solidFill>
-                    <a:srgbClr val="FFFFFF"/>
-                  </a:solidFill>
-                </a14:hiddenFill>
-              </a:ext>
-            </a:extLst>
-          </p:spPr>
-        </p:pic>
-        <p:pic>
-          <p:nvPicPr>
-            <p:cNvPr id="27" name="Picture 2" descr="Site is undergoing maintenance">
-              <a:extLst>
-                <a:ext uri="{FF2B5EF4-FFF2-40B4-BE49-F238E27FC236}">
-                  <a16:creationId xmlns:a16="http://schemas.microsoft.com/office/drawing/2014/main" id="{A9B52DA7-A2A2-0059-A038-02CDC274F002}"/>
-                </a:ext>
-              </a:extLst>
-            </p:cNvPr>
-            <p:cNvPicPr>
-              <a:picLocks noChangeAspect="1" noChangeArrowheads="1"/>
-            </p:cNvPicPr>
-            <p:nvPr/>
-          </p:nvPicPr>
-          <p:blipFill>
-            <a:blip r:embed="rId4">
-              <a:extLst>
-                <a:ext uri="{28A0092B-C50C-407E-A947-70E740481C1C}">
-                  <a14:useLocalDpi xmlns:a14="http://schemas.microsoft.com/office/drawing/2010/main" val="0"/>
-                </a:ext>
-              </a:extLst>
-            </a:blip>
-            <a:srcRect/>
-            <a:stretch>
-              <a:fillRect/>
-            </a:stretch>
-          </p:blipFill>
-          <p:spPr bwMode="auto">
-            <a:xfrm>
-              <a:off x="11766409" y="6449818"/>
-              <a:ext cx="283175" cy="326740"/>
-            </a:xfrm>
-            <a:prstGeom prst="rect">
-              <a:avLst/>
-            </a:prstGeom>
-            <a:noFill/>
-            <a:extLst>
-              <a:ext uri="{909E8E84-426E-40DD-AFC4-6F175D3DCCD1}">
-                <a14:hiddenFill xmlns:a14="http://schemas.microsoft.com/office/drawing/2010/main">
-                  <a:solidFill>
-                    <a:srgbClr val="FFFFFF"/>
-                  </a:solidFill>
-                </a14:hiddenFill>
-              </a:ext>
-            </a:extLst>
-          </p:spPr>
-        </p:pic>
-      </p:grpSp>
       <p:sp>
         <p:nvSpPr>
           <p:cNvPr id="2" name="Title 1">
@@ -8115,8 +7796,12 @@
           <a:lstStyle/>
           <a:p>
             <a:r>
+              <a:rPr lang="nb-NO" sz="3600"/>
+              <a:t>AG-214: </a:t>
+            </a:r>
+            <a:r>
               <a:rPr lang="nb-NO" sz="3600" dirty="0"/>
-              <a:t>AG-222: 2024 timetable</a:t>
+              <a:t>2024 timetable</a:t>
             </a:r>
             <a:endParaRPr lang="en-US" sz="3600" dirty="0"/>
           </a:p>
@@ -8137,14 +7822,14 @@
           <p:nvPr>
             <p:extLst>
               <p:ext uri="{D42A27DB-BD31-4B8C-83A1-F6EECF244321}">
-                <p14:modId xmlns:p14="http://schemas.microsoft.com/office/powerpoint/2010/main" val="729715832"/>
+                <p14:modId xmlns:p14="http://schemas.microsoft.com/office/powerpoint/2010/main" val="1500974049"/>
               </p:ext>
             </p:extLst>
           </p:nvPr>
         </p:nvGraphicFramePr>
         <p:xfrm>
           <a:off x="537663" y="1012111"/>
-          <a:ext cx="11055986" cy="5321820"/>
+          <a:ext cx="11055986" cy="3238262"/>
         </p:xfrm>
         <a:graphic>
           <a:graphicData uri="http://schemas.openxmlformats.org/drawingml/2006/table">
@@ -8232,9 +7917,8 @@
                     <a:p>
                       <a:r>
                         <a:rPr lang="nb-NO" dirty="0"/>
-                        <a:t>29-01 (morning)</a:t>
+                        <a:t>23-09</a:t>
                       </a:r>
-                      <a:endParaRPr lang="en-US" dirty="0"/>
                     </a:p>
                   </a:txBody>
                   <a:tcPr/>
@@ -8244,17 +7928,52 @@
                     <a:bodyPr/>
                     <a:lstStyle/>
                     <a:p>
+                      <a:pPr marL="285750" indent="-285750">
+                        <a:buFontTx/>
+                        <a:buChar char="-"/>
+                      </a:pPr>
                       <a:r>
                         <a:rPr lang="nb-NO" dirty="0"/>
-                        <a:t>- Welcome to Geo-SfM</a:t>
+                        <a:t>Welcome to Geo-SfM</a:t>
                       </a:r>
                     </a:p>
                     <a:p>
+                      <a:pPr marL="285750" indent="-285750">
+                        <a:buFontTx/>
+                        <a:buChar char="-"/>
+                      </a:pPr>
                       <a:r>
                         <a:rPr lang="nb-NO" dirty="0"/>
-                        <a:t>- Session 1: SfM photogrammetry</a:t>
+                        <a:t>Session 1: SfM photogrammetry</a:t>
                       </a:r>
-                      <a:endParaRPr lang="en-US" dirty="0"/>
+                    </a:p>
+                    <a:p>
+                      <a:pPr marL="285750" indent="-285750">
+                        <a:buFontTx/>
+                        <a:buChar char="-"/>
+                      </a:pPr>
+                      <a:r>
+                        <a:rPr lang="en-US" dirty="0"/>
+                        <a:t>Session 2: Small object </a:t>
+                      </a:r>
+                      <a:r>
+                        <a:rPr lang="en-US" dirty="0" err="1"/>
+                        <a:t>SfM</a:t>
+                      </a:r>
+                      <a:r>
+                        <a:rPr lang="en-US" dirty="0"/>
+                        <a:t> photogrammetry</a:t>
+                      </a:r>
+                    </a:p>
+                    <a:p>
+                      <a:pPr marL="285750" indent="-285750">
+                        <a:buFontTx/>
+                        <a:buChar char="-"/>
+                      </a:pPr>
+                      <a:r>
+                        <a:rPr lang="en-US" dirty="0"/>
+                        <a:t>Session 3: Geo-referencing</a:t>
+                      </a:r>
                     </a:p>
                   </a:txBody>
                   <a:tcPr/>
@@ -8264,9 +7983,36 @@
                     <a:bodyPr/>
                     <a:lstStyle/>
                     <a:p>
+                      <a:pPr marL="285750" indent="-285750">
+                        <a:buFontTx/>
+                        <a:buChar char="-"/>
+                      </a:pPr>
                       <a:r>
                         <a:rPr lang="nb-NO" dirty="0"/>
-                        <a:t>- Create account and post to GitHub</a:t>
+                        <a:t>Create account and post to GitHub</a:t>
+                      </a:r>
+                    </a:p>
+                    <a:p>
+                      <a:pPr marL="285750" marR="0" lvl="0" indent="-285750" algn="l" defTabSz="914400" rtl="0" eaLnBrk="1" fontAlgn="auto" latinLnBrk="0" hangingPunct="1">
+                        <a:lnSpc>
+                          <a:spcPct val="100000"/>
+                        </a:lnSpc>
+                        <a:spcBef>
+                          <a:spcPts val="0"/>
+                        </a:spcBef>
+                        <a:spcAft>
+                          <a:spcPts val="0"/>
+                        </a:spcAft>
+                        <a:buClrTx/>
+                        <a:buSzTx/>
+                        <a:buFontTx/>
+                        <a:buChar char="-"/>
+                        <a:tabLst/>
+                        <a:defRPr/>
+                      </a:pPr>
+                      <a:r>
+                        <a:rPr lang="nb-NO" dirty="0"/>
+                        <a:t>Create (small) 3D model</a:t>
                       </a:r>
                       <a:endParaRPr lang="en-US" dirty="0"/>
                     </a:p>
@@ -8304,11 +8050,53 @@
                       </a:pPr>
                       <a:r>
                         <a:rPr lang="nb-NO" dirty="0"/>
-                        <a:t>29-01 (afternoon)</a:t>
+                        <a:t>03-10</a:t>
+                      </a:r>
+                    </a:p>
+                  </a:txBody>
+                  <a:tcPr/>
+                </a:tc>
+                <a:tc>
+                  <a:txBody>
+                    <a:bodyPr/>
+                    <a:lstStyle/>
+                    <a:p>
+                      <a:pPr marL="285750" indent="-285750">
+                        <a:buFontTx/>
+                        <a:buChar char="-"/>
+                      </a:pPr>
+                      <a:r>
+                        <a:rPr lang="en-US" dirty="0"/>
+                        <a:t>Session 2: Small object </a:t>
+                      </a:r>
+                      <a:r>
+                        <a:rPr lang="en-US" dirty="0" err="1"/>
+                        <a:t>SfM</a:t>
+                      </a:r>
+                      <a:r>
+                        <a:rPr lang="en-US" dirty="0"/>
+                        <a:t> photogrammetry</a:t>
                       </a:r>
                     </a:p>
                     <a:p>
-                      <a:pPr marL="0" marR="0" lvl="0" indent="0" algn="l" defTabSz="914400" rtl="0" eaLnBrk="1" fontAlgn="auto" latinLnBrk="0" hangingPunct="1">
+                      <a:pPr marL="285750" indent="-285750">
+                        <a:buFontTx/>
+                        <a:buChar char="-"/>
+                      </a:pPr>
+                      <a:r>
+                        <a:rPr lang="en-US" dirty="0"/>
+                        <a:t>Session 3: Geo-referencing</a:t>
+                      </a:r>
+                    </a:p>
+                  </a:txBody>
+                  <a:tcPr/>
+                </a:tc>
+                <a:tc>
+                  <a:txBody>
+                    <a:bodyPr/>
+                    <a:lstStyle/>
+                    <a:p>
+                      <a:pPr marL="285750" marR="0" lvl="0" indent="-285750" algn="l" defTabSz="914400" rtl="0" eaLnBrk="1" fontAlgn="auto" latinLnBrk="0" hangingPunct="1">
                         <a:lnSpc>
                           <a:spcPct val="100000"/>
                         </a:lnSpc>
@@ -8321,111 +8109,15 @@
                         <a:buClrTx/>
                         <a:buSzTx/>
                         <a:buFontTx/>
-                        <a:buNone/>
+                        <a:buChar char="-"/>
                         <a:tabLst/>
                         <a:defRPr/>
                       </a:pPr>
                       <a:r>
                         <a:rPr lang="nb-NO" dirty="0"/>
-                        <a:t>30-01 (morning)</a:t>
+                        <a:t>Create a georeferenced, (small) 3D model</a:t>
                       </a:r>
                       <a:endParaRPr lang="en-US" dirty="0"/>
-                    </a:p>
-                  </a:txBody>
-                  <a:tcPr/>
-                </a:tc>
-                <a:tc>
-                  <a:txBody>
-                    <a:bodyPr/>
-                    <a:lstStyle/>
-                    <a:p>
-                      <a:pPr marL="0" marR="0" lvl="0" indent="0" algn="l" defTabSz="914400" rtl="0" eaLnBrk="1" fontAlgn="auto" latinLnBrk="0" hangingPunct="1">
-                        <a:lnSpc>
-                          <a:spcPct val="100000"/>
-                        </a:lnSpc>
-                        <a:spcBef>
-                          <a:spcPts val="0"/>
-                        </a:spcBef>
-                        <a:spcAft>
-                          <a:spcPts val="0"/>
-                        </a:spcAft>
-                        <a:buClrTx/>
-                        <a:buSzTx/>
-                        <a:buFontTx/>
-                        <a:buNone/>
-                        <a:tabLst/>
-                        <a:defRPr/>
-                      </a:pPr>
-                      <a:r>
-                        <a:rPr lang="nb-NO" dirty="0"/>
-                        <a:t>- Session 1: SfM photogrammetry</a:t>
-                      </a:r>
-                    </a:p>
-                    <a:p>
-                      <a:pPr marL="0" marR="0" lvl="0" indent="0" algn="l" defTabSz="914400" rtl="0" eaLnBrk="1" fontAlgn="auto" latinLnBrk="0" hangingPunct="1">
-                        <a:lnSpc>
-                          <a:spcPct val="100000"/>
-                        </a:lnSpc>
-                        <a:spcBef>
-                          <a:spcPts val="0"/>
-                        </a:spcBef>
-                        <a:spcAft>
-                          <a:spcPts val="0"/>
-                        </a:spcAft>
-                        <a:buClrTx/>
-                        <a:buSzTx/>
-                        <a:buFontTx/>
-                        <a:buNone/>
-                        <a:tabLst/>
-                        <a:defRPr/>
-                      </a:pPr>
-                      <a:r>
-                        <a:rPr lang="nb-NO" dirty="0"/>
-                        <a:t>- Session 4: Small object «»</a:t>
-                      </a:r>
-                    </a:p>
-                    <a:p>
-                      <a:pPr marL="0" marR="0" lvl="0" indent="0" algn="l" defTabSz="914400" rtl="0" eaLnBrk="1" fontAlgn="auto" latinLnBrk="0" hangingPunct="1">
-                        <a:lnSpc>
-                          <a:spcPct val="100000"/>
-                        </a:lnSpc>
-                        <a:spcBef>
-                          <a:spcPts val="0"/>
-                        </a:spcBef>
-                        <a:spcAft>
-                          <a:spcPts val="0"/>
-                        </a:spcAft>
-                        <a:buClrTx/>
-                        <a:buSzTx/>
-                        <a:buFontTx/>
-                        <a:buNone/>
-                        <a:tabLst/>
-                        <a:defRPr/>
-                      </a:pPr>
-                      <a:r>
-                        <a:rPr lang="nb-NO" dirty="0"/>
-                        <a:t>- Session 6: Publish 3D models</a:t>
-                      </a:r>
-                      <a:endParaRPr lang="en-US" dirty="0"/>
-                    </a:p>
-                  </a:txBody>
-                  <a:tcPr/>
-                </a:tc>
-                <a:tc>
-                  <a:txBody>
-                    <a:bodyPr/>
-                    <a:lstStyle/>
-                    <a:p>
-                      <a:r>
-                        <a:rPr lang="nb-NO" dirty="0"/>
-                        <a:t>- Create 3D model from stretch (inc. Exercise 1 deliverable)</a:t>
-                      </a:r>
-                    </a:p>
-                    <a:p>
-                      <a:r>
-                        <a:rPr lang="nb-NO" dirty="0"/>
-                        <a:t>- Upload to SketchFab</a:t>
-                      </a:r>
                     </a:p>
                   </a:txBody>
                   <a:tcPr/>
@@ -8461,11 +8153,19 @@
                       </a:pPr>
                       <a:r>
                         <a:rPr lang="nb-NO" dirty="0"/>
-                        <a:t>30-01 (afternoon)</a:t>
+                        <a:t>04-10</a:t>
                       </a:r>
+                      <a:endParaRPr lang="en-US" dirty="0"/>
                     </a:p>
+                  </a:txBody>
+                  <a:tcPr/>
+                </a:tc>
+                <a:tc>
+                  <a:txBody>
+                    <a:bodyPr/>
+                    <a:lstStyle/>
                     <a:p>
-                      <a:pPr marL="0" marR="0" lvl="0" indent="0" algn="l" defTabSz="914400" rtl="0" eaLnBrk="1" fontAlgn="auto" latinLnBrk="0" hangingPunct="1">
+                      <a:pPr marL="285750" marR="0" lvl="0" indent="-285750" algn="l" defTabSz="914400" rtl="0" eaLnBrk="1" fontAlgn="auto" latinLnBrk="0" hangingPunct="1">
                         <a:lnSpc>
                           <a:spcPct val="100000"/>
                         </a:lnSpc>
@@ -8478,15 +8178,24 @@
                         <a:buClrTx/>
                         <a:buSzTx/>
                         <a:buFontTx/>
-                        <a:buNone/>
+                        <a:buChar char="-"/>
                         <a:tabLst/>
                         <a:defRPr/>
                       </a:pPr>
                       <a:r>
-                        <a:rPr lang="nb-NO" dirty="0"/>
-                        <a:t>31-01 (morning)</a:t>
+                        <a:rPr lang="en-US" dirty="0"/>
+                        <a:t>Session 4: Automation</a:t>
                       </a:r>
-                      <a:endParaRPr lang="en-US" dirty="0"/>
+                    </a:p>
+                    <a:p>
+                      <a:pPr marL="285750" indent="-285750">
+                        <a:buFontTx/>
+                        <a:buChar char="-"/>
+                      </a:pPr>
+                      <a:r>
+                        <a:rPr lang="en-US" dirty="0"/>
+                        <a:t>Session 5: Geomodelling</a:t>
+                      </a:r>
                     </a:p>
                   </a:txBody>
                   <a:tcPr/>
@@ -8496,30 +8205,7 @@
                     <a:bodyPr/>
                     <a:lstStyle/>
                     <a:p>
-                      <a:r>
-                        <a:rPr lang="nb-NO" dirty="0"/>
-                        <a:t>- Session 2: Geo-referencing</a:t>
-                      </a:r>
-                    </a:p>
-                    <a:p>
-                      <a:endParaRPr lang="nb-NO" dirty="0"/>
-                    </a:p>
-                    <a:p>
-                      <a:r>
-                        <a:rPr lang="nb-NO" dirty="0"/>
-                        <a:t>- Session 6: Publish 3D models</a:t>
-                      </a:r>
-                      <a:endParaRPr lang="en-US" dirty="0"/>
-                    </a:p>
-                  </a:txBody>
-                  <a:tcPr/>
-                </a:tc>
-                <a:tc>
-                  <a:txBody>
-                    <a:bodyPr/>
-                    <a:lstStyle/>
-                    <a:p>
-                      <a:pPr marL="0" marR="0" lvl="0" indent="0" algn="l" defTabSz="914400" rtl="0" eaLnBrk="1" fontAlgn="auto" latinLnBrk="0" hangingPunct="1">
+                      <a:pPr marL="285750" marR="0" lvl="0" indent="-285750" algn="l" defTabSz="914400" rtl="0" eaLnBrk="1" fontAlgn="auto" latinLnBrk="0" hangingPunct="1">
                         <a:lnSpc>
                           <a:spcPct val="100000"/>
                         </a:lnSpc>
@@ -8532,17 +8218,17 @@
                         <a:buClrTx/>
                         <a:buSzTx/>
                         <a:buFontTx/>
-                        <a:buNone/>
+                        <a:buChar char="-"/>
                         <a:tabLst/>
                         <a:defRPr/>
                       </a:pPr>
                       <a:r>
                         <a:rPr lang="nb-NO" dirty="0"/>
-                        <a:t>- Create a georeferenced 3D model , inc. metadata</a:t>
+                        <a:t>Create a digital outcrop model</a:t>
                       </a:r>
                     </a:p>
                     <a:p>
-                      <a:pPr marL="0" marR="0" lvl="0" indent="0" algn="l" defTabSz="914400" rtl="0" eaLnBrk="1" fontAlgn="auto" latinLnBrk="0" hangingPunct="1">
+                      <a:pPr marL="285750" marR="0" lvl="0" indent="-285750" algn="l" defTabSz="914400" rtl="0" eaLnBrk="1" fontAlgn="auto" latinLnBrk="0" hangingPunct="1">
                         <a:lnSpc>
                           <a:spcPct val="100000"/>
                         </a:lnSpc>
@@ -8555,13 +8241,13 @@
                         <a:buClrTx/>
                         <a:buSzTx/>
                         <a:buFontTx/>
-                        <a:buNone/>
+                        <a:buChar char="-"/>
                         <a:tabLst/>
                         <a:defRPr/>
                       </a:pPr>
                       <a:r>
                         <a:rPr lang="nb-NO" dirty="0"/>
-                        <a:t>- Upload to SketchFab</a:t>
+                        <a:t>Annotate a digital outcrop model</a:t>
                       </a:r>
                     </a:p>
                   </a:txBody>
@@ -8573,223 +8259,161 @@
                   </a:ext>
                 </a:extLst>
               </a:tr>
-              <a:tr h="1308141">
-                <a:tc>
-                  <a:txBody>
-                    <a:bodyPr/>
-                    <a:lstStyle/>
-                    <a:p>
-                      <a:r>
-                        <a:rPr lang="nb-NO" dirty="0"/>
-                        <a:t>31-01 (afternoon)</a:t>
-                      </a:r>
-                    </a:p>
-                    <a:p>
-                      <a:r>
-                        <a:rPr lang="en-US" dirty="0"/>
-                        <a:t>01-02</a:t>
-                      </a:r>
-                    </a:p>
-                  </a:txBody>
-                  <a:tcPr/>
-                </a:tc>
-                <a:tc>
-                  <a:txBody>
-                    <a:bodyPr/>
-                    <a:lstStyle/>
-                    <a:p>
-                      <a:r>
-                        <a:rPr lang="nb-NO" dirty="0"/>
-                        <a:t>- Session 3: Automation</a:t>
-                      </a:r>
-                    </a:p>
-                    <a:p>
-                      <a:endParaRPr lang="nb-NO" dirty="0"/>
-                    </a:p>
-                    <a:p>
-                      <a:pPr marL="0" marR="0" lvl="0" indent="0" algn="l" defTabSz="914400" rtl="0" eaLnBrk="1" fontAlgn="auto" latinLnBrk="0" hangingPunct="1">
-                        <a:lnSpc>
-                          <a:spcPct val="100000"/>
-                        </a:lnSpc>
-                        <a:spcBef>
-                          <a:spcPts val="0"/>
-                        </a:spcBef>
-                        <a:spcAft>
-                          <a:spcPts val="0"/>
-                        </a:spcAft>
-                        <a:buClrTx/>
-                        <a:buSzTx/>
-                        <a:buFontTx/>
-                        <a:buNone/>
-                        <a:tabLst/>
-                        <a:defRPr/>
-                      </a:pPr>
-                      <a:r>
-                        <a:rPr lang="nb-NO" dirty="0"/>
-                        <a:t>- Session 4: using the lightbox</a:t>
-                      </a:r>
-                    </a:p>
-                    <a:p>
-                      <a:pPr marL="0" marR="0" lvl="0" indent="0" algn="l" defTabSz="914400" rtl="0" eaLnBrk="1" fontAlgn="auto" latinLnBrk="0" hangingPunct="1">
-                        <a:lnSpc>
-                          <a:spcPct val="100000"/>
-                        </a:lnSpc>
-                        <a:spcBef>
-                          <a:spcPts val="0"/>
-                        </a:spcBef>
-                        <a:spcAft>
-                          <a:spcPts val="0"/>
-                        </a:spcAft>
-                        <a:buClrTx/>
-                        <a:buSzTx/>
-                        <a:buFontTx/>
-                        <a:buNone/>
-                        <a:tabLst/>
-                        <a:defRPr/>
-                      </a:pPr>
-                      <a:r>
-                        <a:rPr lang="nb-NO" dirty="0"/>
-                        <a:t>- Session 5: geomodelling/interpretations</a:t>
-                      </a:r>
-                      <a:endParaRPr lang="en-US" dirty="0"/>
-                    </a:p>
-                    <a:p>
-                      <a:pPr marL="0" marR="0" lvl="0" indent="0" algn="l" defTabSz="914400" rtl="0" eaLnBrk="1" fontAlgn="auto" latinLnBrk="0" hangingPunct="1">
-                        <a:lnSpc>
-                          <a:spcPct val="100000"/>
-                        </a:lnSpc>
-                        <a:spcBef>
-                          <a:spcPts val="0"/>
-                        </a:spcBef>
-                        <a:spcAft>
-                          <a:spcPts val="0"/>
-                        </a:spcAft>
-                        <a:buClrTx/>
-                        <a:buSzTx/>
-                        <a:buFontTx/>
-                        <a:buNone/>
-                        <a:tabLst/>
-                        <a:defRPr/>
-                      </a:pPr>
-                      <a:endParaRPr lang="nb-NO" dirty="0"/>
-                    </a:p>
-                  </a:txBody>
-                  <a:tcPr/>
-                </a:tc>
-                <a:tc>
-                  <a:txBody>
-                    <a:bodyPr/>
-                    <a:lstStyle/>
-                    <a:p>
-                      <a:pPr marL="0" marR="0" lvl="0" indent="0" algn="l" defTabSz="914400" rtl="0" eaLnBrk="1" fontAlgn="auto" latinLnBrk="0" hangingPunct="1">
-                        <a:lnSpc>
-                          <a:spcPct val="100000"/>
-                        </a:lnSpc>
-                        <a:spcBef>
-                          <a:spcPts val="0"/>
-                        </a:spcBef>
-                        <a:spcAft>
-                          <a:spcPts val="0"/>
-                        </a:spcAft>
-                        <a:buClrTx/>
-                        <a:buSzTx/>
-                        <a:buFontTx/>
-                        <a:buNone/>
-                        <a:tabLst/>
-                        <a:defRPr/>
-                      </a:pPr>
-                      <a:r>
-                        <a:rPr lang="nb-NO" dirty="0"/>
-                        <a:t>- Create a georeferenced 3D model , inc. metadata</a:t>
-                      </a:r>
-                    </a:p>
-                    <a:p>
-                      <a:endParaRPr lang="en-US" dirty="0"/>
-                    </a:p>
-                    <a:p>
-                      <a:r>
-                        <a:rPr lang="en-US" dirty="0"/>
-                        <a:t>- import orthophoto /DEM/interpretations into QGIS/ArcGIS</a:t>
-                      </a:r>
-                    </a:p>
-                  </a:txBody>
-                  <a:tcPr/>
-                </a:tc>
-                <a:extLst>
-                  <a:ext uri="{0D108BD9-81ED-4DB2-BD59-A6C34878D82A}">
-                    <a16:rowId xmlns:a16="http://schemas.microsoft.com/office/drawing/2014/main" val="1853486059"/>
-                  </a:ext>
-                </a:extLst>
-              </a:tr>
-              <a:tr h="572312">
-                <a:tc>
-                  <a:txBody>
-                    <a:bodyPr/>
-                    <a:lstStyle/>
-                    <a:p>
-                      <a:pPr marL="0" marR="0" lvl="0" indent="0" algn="l" defTabSz="914400" rtl="0" eaLnBrk="1" fontAlgn="auto" latinLnBrk="0" hangingPunct="1">
-                        <a:lnSpc>
-                          <a:spcPct val="100000"/>
-                        </a:lnSpc>
-                        <a:spcBef>
-                          <a:spcPts val="0"/>
-                        </a:spcBef>
-                        <a:spcAft>
-                          <a:spcPts val="0"/>
-                        </a:spcAft>
-                        <a:buClrTx/>
-                        <a:buSzTx/>
-                        <a:buFontTx/>
-                        <a:buNone/>
-                        <a:tabLst/>
-                        <a:defRPr/>
-                      </a:pPr>
-                      <a:r>
-                        <a:rPr lang="nb-NO" dirty="0"/>
-                        <a:t>02-02 (morning)</a:t>
-                      </a:r>
-                    </a:p>
-                  </a:txBody>
-                  <a:tcPr/>
-                </a:tc>
-                <a:tc>
-                  <a:txBody>
-                    <a:bodyPr/>
-                    <a:lstStyle/>
-                    <a:p>
-                      <a:r>
-                        <a:rPr lang="nb-NO" dirty="0"/>
-                        <a:t>Questionnaire</a:t>
-                      </a:r>
-                      <a:endParaRPr lang="en-US" dirty="0"/>
-                    </a:p>
-                  </a:txBody>
-                  <a:tcPr/>
-                </a:tc>
-                <a:tc>
-                  <a:txBody>
-                    <a:bodyPr/>
-                    <a:lstStyle/>
-                    <a:p>
-                      <a:r>
-                        <a:rPr lang="nb-NO" dirty="0"/>
-                        <a:t>Questionnaire</a:t>
-                      </a:r>
-                      <a:endParaRPr lang="en-US" dirty="0"/>
-                    </a:p>
-                  </a:txBody>
-                  <a:tcPr/>
-                </a:tc>
-                <a:extLst>
-                  <a:ext uri="{0D108BD9-81ED-4DB2-BD59-A6C34878D82A}">
-                    <a16:rowId xmlns:a16="http://schemas.microsoft.com/office/drawing/2014/main" val="3144115684"/>
-                  </a:ext>
-                </a:extLst>
-              </a:tr>
             </a:tbl>
           </a:graphicData>
         </a:graphic>
       </p:graphicFrame>
+      <p:grpSp>
+        <p:nvGrpSpPr>
+          <p:cNvPr id="3" name="Group 2">
+            <a:extLst>
+              <a:ext uri="{FF2B5EF4-FFF2-40B4-BE49-F238E27FC236}">
+                <a16:creationId xmlns:a16="http://schemas.microsoft.com/office/drawing/2014/main" id="{D0295AE9-B9BE-D78B-CFF5-81DE9C8ECE60}"/>
+              </a:ext>
+            </a:extLst>
+          </p:cNvPr>
+          <p:cNvGrpSpPr/>
+          <p:nvPr/>
+        </p:nvGrpSpPr>
+        <p:grpSpPr>
+          <a:xfrm>
+            <a:off x="9704900" y="6443508"/>
+            <a:ext cx="2344684" cy="333050"/>
+            <a:chOff x="9704900" y="6443508"/>
+            <a:chExt cx="2344684" cy="333050"/>
+          </a:xfrm>
+        </p:grpSpPr>
+        <p:pic>
+          <p:nvPicPr>
+            <p:cNvPr id="11" name="Picture 2" descr="UNIS - The university centre in Svalbard">
+              <a:extLst>
+                <a:ext uri="{FF2B5EF4-FFF2-40B4-BE49-F238E27FC236}">
+                  <a16:creationId xmlns:a16="http://schemas.microsoft.com/office/drawing/2014/main" id="{F69846FC-0AC2-797C-08D1-E008C1B0B464}"/>
+                </a:ext>
+              </a:extLst>
+            </p:cNvPr>
+            <p:cNvPicPr>
+              <a:picLocks noChangeAspect="1" noChangeArrowheads="1"/>
+            </p:cNvPicPr>
+            <p:nvPr/>
+          </p:nvPicPr>
+          <p:blipFill>
+            <a:blip r:embed="rId2">
+              <a:extLst>
+                <a:ext uri="{28A0092B-C50C-407E-A947-70E740481C1C}">
+                  <a14:useLocalDpi xmlns:a14="http://schemas.microsoft.com/office/drawing/2010/main" val="0"/>
+                </a:ext>
+              </a:extLst>
+            </a:blip>
+            <a:srcRect/>
+            <a:stretch>
+              <a:fillRect/>
+            </a:stretch>
+          </p:blipFill>
+          <p:spPr bwMode="auto">
+            <a:xfrm>
+              <a:off x="10413848" y="6443508"/>
+              <a:ext cx="1210145" cy="326740"/>
+            </a:xfrm>
+            <a:prstGeom prst="rect">
+              <a:avLst/>
+            </a:prstGeom>
+            <a:noFill/>
+            <a:extLst>
+              <a:ext uri="{909E8E84-426E-40DD-AFC4-6F175D3DCCD1}">
+                <a14:hiddenFill xmlns:a14="http://schemas.microsoft.com/office/drawing/2010/main">
+                  <a:solidFill>
+                    <a:srgbClr val="FFFFFF"/>
+                  </a:solidFill>
+                </a14:hiddenFill>
+              </a:ext>
+            </a:extLst>
+          </p:spPr>
+        </p:pic>
+        <p:pic>
+          <p:nvPicPr>
+            <p:cNvPr id="12" name="Picture 2" descr="Site is undergoing maintenance">
+              <a:extLst>
+                <a:ext uri="{FF2B5EF4-FFF2-40B4-BE49-F238E27FC236}">
+                  <a16:creationId xmlns:a16="http://schemas.microsoft.com/office/drawing/2014/main" id="{B309E4B4-0892-B56D-6ABE-361E2621A0CA}"/>
+                </a:ext>
+              </a:extLst>
+            </p:cNvPr>
+            <p:cNvPicPr>
+              <a:picLocks noChangeAspect="1" noChangeArrowheads="1"/>
+            </p:cNvPicPr>
+            <p:nvPr/>
+          </p:nvPicPr>
+          <p:blipFill>
+            <a:blip r:embed="rId3">
+              <a:extLst>
+                <a:ext uri="{28A0092B-C50C-407E-A947-70E740481C1C}">
+                  <a14:useLocalDpi xmlns:a14="http://schemas.microsoft.com/office/drawing/2010/main" val="0"/>
+                </a:ext>
+              </a:extLst>
+            </a:blip>
+            <a:srcRect/>
+            <a:stretch>
+              <a:fillRect/>
+            </a:stretch>
+          </p:blipFill>
+          <p:spPr bwMode="auto">
+            <a:xfrm>
+              <a:off x="11766409" y="6449818"/>
+              <a:ext cx="283175" cy="326740"/>
+            </a:xfrm>
+            <a:prstGeom prst="rect">
+              <a:avLst/>
+            </a:prstGeom>
+            <a:noFill/>
+            <a:extLst>
+              <a:ext uri="{909E8E84-426E-40DD-AFC4-6F175D3DCCD1}">
+                <a14:hiddenFill xmlns:a14="http://schemas.microsoft.com/office/drawing/2010/main">
+                  <a:solidFill>
+                    <a:srgbClr val="FFFFFF"/>
+                  </a:solidFill>
+                </a14:hiddenFill>
+              </a:ext>
+            </a:extLst>
+          </p:spPr>
+        </p:pic>
+        <p:pic>
+          <p:nvPicPr>
+            <p:cNvPr id="15" name="Picture 14" descr="A black background with grey letters and a red triangle&#10;&#10;Description automatically generated">
+              <a:extLst>
+                <a:ext uri="{FF2B5EF4-FFF2-40B4-BE49-F238E27FC236}">
+                  <a16:creationId xmlns:a16="http://schemas.microsoft.com/office/drawing/2014/main" id="{D4868902-56D2-4DF3-1636-EF0C340483B1}"/>
+                </a:ext>
+              </a:extLst>
+            </p:cNvPr>
+            <p:cNvPicPr>
+              <a:picLocks noChangeAspect="1"/>
+            </p:cNvPicPr>
+            <p:nvPr/>
+          </p:nvPicPr>
+          <p:blipFill>
+            <a:blip r:embed="rId4">
+              <a:extLst>
+                <a:ext uri="{28A0092B-C50C-407E-A947-70E740481C1C}">
+                  <a14:useLocalDpi xmlns:a14="http://schemas.microsoft.com/office/drawing/2010/main" val="0"/>
+                </a:ext>
+              </a:extLst>
+            </a:blip>
+            <a:stretch>
+              <a:fillRect/>
+            </a:stretch>
+          </p:blipFill>
+          <p:spPr>
+            <a:xfrm>
+              <a:off x="9704900" y="6486750"/>
+              <a:ext cx="580285" cy="270414"/>
+            </a:xfrm>
+            <a:prstGeom prst="rect">
+              <a:avLst/>
+            </a:prstGeom>
+          </p:spPr>
+        </p:pic>
+      </p:grpSp>
     </p:spTree>
     <p:extLst>
       <p:ext uri="{BB962C8B-B14F-4D97-AF65-F5344CB8AC3E}">
@@ -9570,12 +9194,92 @@
           </a:p>
         </p:txBody>
       </p:sp>
+      <p:sp>
+        <p:nvSpPr>
+          <p:cNvPr id="2" name="Title 1">
+            <a:extLst>
+              <a:ext uri="{FF2B5EF4-FFF2-40B4-BE49-F238E27FC236}">
+                <a16:creationId xmlns:a16="http://schemas.microsoft.com/office/drawing/2014/main" id="{044D5C86-6C13-B385-18EB-CE82554A07BC}"/>
+              </a:ext>
+            </a:extLst>
+          </p:cNvPr>
+          <p:cNvSpPr>
+            <a:spLocks noGrp="1"/>
+          </p:cNvSpPr>
+          <p:nvPr>
+            <p:ph type="title"/>
+          </p:nvPr>
+        </p:nvSpPr>
+        <p:spPr>
+          <a:xfrm>
+            <a:off x="1676400" y="-7563"/>
+            <a:ext cx="10515600" cy="1325563"/>
+          </a:xfrm>
+        </p:spPr>
+        <p:txBody>
+          <a:bodyPr>
+            <a:normAutofit/>
+          </a:bodyPr>
+          <a:lstStyle/>
+          <a:p>
+            <a:r>
+              <a:rPr lang="nb-NO" sz="3600" dirty="0"/>
+              <a:t>Geo-SfM platform: Github?</a:t>
+            </a:r>
+            <a:endParaRPr lang="en-US" sz="3600" dirty="0"/>
+          </a:p>
+        </p:txBody>
+      </p:sp>
+      <p:sp>
+        <p:nvSpPr>
+          <p:cNvPr id="3" name="Content Placeholder 2">
+            <a:extLst>
+              <a:ext uri="{FF2B5EF4-FFF2-40B4-BE49-F238E27FC236}">
+                <a16:creationId xmlns:a16="http://schemas.microsoft.com/office/drawing/2014/main" id="{2D0EA7A2-E4A5-2799-2A25-121BD1FEE728}"/>
+              </a:ext>
+            </a:extLst>
+          </p:cNvPr>
+          <p:cNvSpPr>
+            <a:spLocks noGrp="1"/>
+          </p:cNvSpPr>
+          <p:nvPr>
+            <p:ph idx="1"/>
+          </p:nvPr>
+        </p:nvSpPr>
+        <p:spPr>
+          <a:xfrm>
+            <a:off x="838199" y="1825625"/>
+            <a:ext cx="10785793" cy="4351338"/>
+          </a:xfrm>
+        </p:spPr>
+        <p:txBody>
+          <a:bodyPr>
+            <a:normAutofit/>
+          </a:bodyPr>
+          <a:lstStyle/>
+          <a:p>
+            <a:endParaRPr lang="nb-NO" dirty="0"/>
+          </a:p>
+          <a:p>
+            <a:endParaRPr lang="nb-NO" sz="2800" dirty="0"/>
+          </a:p>
+          <a:p>
+            <a:endParaRPr lang="nb-NO" sz="2800" dirty="0"/>
+          </a:p>
+          <a:p>
+            <a:pPr marL="0" indent="0">
+              <a:buNone/>
+            </a:pPr>
+            <a:endParaRPr lang="en-US" sz="2800" dirty="0"/>
+          </a:p>
+        </p:txBody>
+      </p:sp>
       <p:grpSp>
         <p:nvGrpSpPr>
-          <p:cNvPr id="23" name="Group 22">
-            <a:extLst>
-              <a:ext uri="{FF2B5EF4-FFF2-40B4-BE49-F238E27FC236}">
-                <a16:creationId xmlns:a16="http://schemas.microsoft.com/office/drawing/2014/main" id="{5C8CC107-8B6F-2BA8-A951-E8276E1CAFC8}"/>
+          <p:cNvPr id="11" name="Group 10">
+            <a:extLst>
+              <a:ext uri="{FF2B5EF4-FFF2-40B4-BE49-F238E27FC236}">
+                <a16:creationId xmlns:a16="http://schemas.microsoft.com/office/drawing/2014/main" id="{39FA12A0-93EB-9667-D138-6CFEC34513E7}"/>
               </a:ext>
             </a:extLst>
           </p:cNvPr>
@@ -9584,65 +9288,23 @@
         </p:nvGrpSpPr>
         <p:grpSpPr>
           <a:xfrm>
-            <a:off x="42671" y="6443508"/>
-            <a:ext cx="12006913" cy="385818"/>
-            <a:chOff x="42671" y="6443508"/>
-            <a:chExt cx="12006913" cy="385818"/>
+            <a:off x="9704900" y="6443508"/>
+            <a:ext cx="2344684" cy="333050"/>
+            <a:chOff x="9704900" y="6443508"/>
+            <a:chExt cx="2344684" cy="333050"/>
           </a:xfrm>
         </p:grpSpPr>
-        <p:sp>
-          <p:nvSpPr>
-            <p:cNvPr id="24" name="TextBox 23">
+        <p:pic>
+          <p:nvPicPr>
+            <p:cNvPr id="12" name="Picture 2" descr="UNIS - The university centre in Svalbard">
               <a:extLst>
                 <a:ext uri="{FF2B5EF4-FFF2-40B4-BE49-F238E27FC236}">
-                  <a16:creationId xmlns:a16="http://schemas.microsoft.com/office/drawing/2014/main" id="{1B538703-361B-3F8B-537E-BBCFEBB6CACC}"/>
-                </a:ext>
-              </a:extLst>
-            </p:cNvPr>
-            <p:cNvSpPr txBox="1"/>
-            <p:nvPr/>
-          </p:nvSpPr>
-          <p:spPr>
-            <a:xfrm>
-              <a:off x="854075" y="6521549"/>
-              <a:ext cx="3805382" cy="307777"/>
-            </a:xfrm>
-            <a:prstGeom prst="rect">
-              <a:avLst/>
-            </a:prstGeom>
-            <a:noFill/>
-          </p:spPr>
-          <p:txBody>
-            <a:bodyPr wrap="square" rtlCol="0">
-              <a:spAutoFit/>
-            </a:bodyPr>
-            <a:lstStyle/>
-            <a:p>
-              <a:r>
-                <a:rPr lang="nb-NO" sz="1400" i="1" dirty="0">
-                  <a:latin typeface="Arial" panose="020B0604020202020204" pitchFamily="34" charset="0"/>
-                  <a:cs typeface="Arial" panose="020B0604020202020204" pitchFamily="34" charset="0"/>
-                </a:rPr>
-                <a:t>FAIR digital documentation &amp; teaching</a:t>
-              </a:r>
-              <a:endParaRPr lang="en-US" sz="1400" i="1" dirty="0">
-                <a:latin typeface="Arial" panose="020B0604020202020204" pitchFamily="34" charset="0"/>
-                <a:cs typeface="Arial" panose="020B0604020202020204" pitchFamily="34" charset="0"/>
-              </a:endParaRPr>
-            </a:p>
-          </p:txBody>
-        </p:sp>
-        <p:pic>
-          <p:nvPicPr>
-            <p:cNvPr id="25" name="Picture 24" descr="A screenshot of a video game&#10;&#10;Description automatically generated">
-              <a:extLst>
-                <a:ext uri="{FF2B5EF4-FFF2-40B4-BE49-F238E27FC236}">
-                  <a16:creationId xmlns:a16="http://schemas.microsoft.com/office/drawing/2014/main" id="{5F21D3D7-314B-1C6E-B50E-93CFE61D5082}"/>
+                  <a16:creationId xmlns:a16="http://schemas.microsoft.com/office/drawing/2014/main" id="{B13E6562-7F10-94CA-EB1A-BE7B895B4843}"/>
                 </a:ext>
               </a:extLst>
             </p:cNvPr>
             <p:cNvPicPr>
-              <a:picLocks noChangeAspect="1"/>
+              <a:picLocks noChangeAspect="1" noChangeArrowheads="1"/>
             </p:cNvPicPr>
             <p:nvPr/>
           </p:nvPicPr>
@@ -9654,26 +9316,37 @@
                 </a:ext>
               </a:extLst>
             </a:blip>
+            <a:srcRect/>
             <a:stretch>
               <a:fillRect/>
             </a:stretch>
           </p:blipFill>
-          <p:spPr>
+          <p:spPr bwMode="auto">
             <a:xfrm>
-              <a:off x="42671" y="6563571"/>
-              <a:ext cx="876716" cy="230005"/>
+              <a:off x="10413848" y="6443508"/>
+              <a:ext cx="1210145" cy="326740"/>
             </a:xfrm>
             <a:prstGeom prst="rect">
               <a:avLst/>
             </a:prstGeom>
+            <a:noFill/>
+            <a:extLst>
+              <a:ext uri="{909E8E84-426E-40DD-AFC4-6F175D3DCCD1}">
+                <a14:hiddenFill xmlns:a14="http://schemas.microsoft.com/office/drawing/2010/main">
+                  <a:solidFill>
+                    <a:srgbClr val="FFFFFF"/>
+                  </a:solidFill>
+                </a14:hiddenFill>
+              </a:ext>
+            </a:extLst>
           </p:spPr>
         </p:pic>
         <p:pic>
           <p:nvPicPr>
-            <p:cNvPr id="26" name="Picture 2" descr="UNIS - The university centre in Svalbard">
+            <p:cNvPr id="14" name="Picture 2" descr="Site is undergoing maintenance">
               <a:extLst>
                 <a:ext uri="{FF2B5EF4-FFF2-40B4-BE49-F238E27FC236}">
-                  <a16:creationId xmlns:a16="http://schemas.microsoft.com/office/drawing/2014/main" id="{3FBB4A11-E9C3-D45E-8EDE-6CF34C32E59B}"/>
+                  <a16:creationId xmlns:a16="http://schemas.microsoft.com/office/drawing/2014/main" id="{7FC20674-0AD5-99AE-09FA-EE5597A739AC}"/>
                 </a:ext>
               </a:extLst>
             </p:cNvPr>
@@ -9697,8 +9370,8 @@
           </p:blipFill>
           <p:spPr bwMode="auto">
             <a:xfrm>
-              <a:off x="10413848" y="6443508"/>
-              <a:ext cx="1210145" cy="326740"/>
+              <a:off x="11766409" y="6449818"/>
+              <a:ext cx="283175" cy="326740"/>
             </a:xfrm>
             <a:prstGeom prst="rect">
               <a:avLst/>
@@ -9717,15 +9390,15 @@
         </p:pic>
         <p:pic>
           <p:nvPicPr>
-            <p:cNvPr id="27" name="Picture 2" descr="Site is undergoing maintenance">
+            <p:cNvPr id="15" name="Picture 14" descr="A black background with grey letters and a red triangle&#10;&#10;Description automatically generated">
               <a:extLst>
                 <a:ext uri="{FF2B5EF4-FFF2-40B4-BE49-F238E27FC236}">
-                  <a16:creationId xmlns:a16="http://schemas.microsoft.com/office/drawing/2014/main" id="{A9B52DA7-A2A2-0059-A038-02CDC274F002}"/>
+                  <a16:creationId xmlns:a16="http://schemas.microsoft.com/office/drawing/2014/main" id="{E4AE02E2-BA0E-2721-3873-1FDD65148C13}"/>
                 </a:ext>
               </a:extLst>
             </p:cNvPr>
             <p:cNvPicPr>
-              <a:picLocks noChangeAspect="1" noChangeArrowheads="1"/>
+              <a:picLocks noChangeAspect="1"/>
             </p:cNvPicPr>
             <p:nvPr/>
           </p:nvPicPr>
@@ -9737,112 +9410,21 @@
                 </a:ext>
               </a:extLst>
             </a:blip>
-            <a:srcRect/>
             <a:stretch>
               <a:fillRect/>
             </a:stretch>
           </p:blipFill>
-          <p:spPr bwMode="auto">
+          <p:spPr>
             <a:xfrm>
-              <a:off x="11766409" y="6449818"/>
-              <a:ext cx="283175" cy="326740"/>
+              <a:off x="9704900" y="6486750"/>
+              <a:ext cx="580285" cy="270414"/>
             </a:xfrm>
             <a:prstGeom prst="rect">
               <a:avLst/>
             </a:prstGeom>
-            <a:noFill/>
-            <a:extLst>
-              <a:ext uri="{909E8E84-426E-40DD-AFC4-6F175D3DCCD1}">
-                <a14:hiddenFill xmlns:a14="http://schemas.microsoft.com/office/drawing/2010/main">
-                  <a:solidFill>
-                    <a:srgbClr val="FFFFFF"/>
-                  </a:solidFill>
-                </a14:hiddenFill>
-              </a:ext>
-            </a:extLst>
           </p:spPr>
         </p:pic>
       </p:grpSp>
-      <p:sp>
-        <p:nvSpPr>
-          <p:cNvPr id="2" name="Title 1">
-            <a:extLst>
-              <a:ext uri="{FF2B5EF4-FFF2-40B4-BE49-F238E27FC236}">
-                <a16:creationId xmlns:a16="http://schemas.microsoft.com/office/drawing/2014/main" id="{044D5C86-6C13-B385-18EB-CE82554A07BC}"/>
-              </a:ext>
-            </a:extLst>
-          </p:cNvPr>
-          <p:cNvSpPr>
-            <a:spLocks noGrp="1"/>
-          </p:cNvSpPr>
-          <p:nvPr>
-            <p:ph type="title"/>
-          </p:nvPr>
-        </p:nvSpPr>
-        <p:spPr>
-          <a:xfrm>
-            <a:off x="1676400" y="-7563"/>
-            <a:ext cx="10515600" cy="1325563"/>
-          </a:xfrm>
-        </p:spPr>
-        <p:txBody>
-          <a:bodyPr>
-            <a:normAutofit/>
-          </a:bodyPr>
-          <a:lstStyle/>
-          <a:p>
-            <a:r>
-              <a:rPr lang="nb-NO" sz="3600" dirty="0"/>
-              <a:t>Geo-SfM platform: Github?</a:t>
-            </a:r>
-            <a:endParaRPr lang="en-US" sz="3600" dirty="0"/>
-          </a:p>
-        </p:txBody>
-      </p:sp>
-      <p:sp>
-        <p:nvSpPr>
-          <p:cNvPr id="3" name="Content Placeholder 2">
-            <a:extLst>
-              <a:ext uri="{FF2B5EF4-FFF2-40B4-BE49-F238E27FC236}">
-                <a16:creationId xmlns:a16="http://schemas.microsoft.com/office/drawing/2014/main" id="{2D0EA7A2-E4A5-2799-2A25-121BD1FEE728}"/>
-              </a:ext>
-            </a:extLst>
-          </p:cNvPr>
-          <p:cNvSpPr>
-            <a:spLocks noGrp="1"/>
-          </p:cNvSpPr>
-          <p:nvPr>
-            <p:ph idx="1"/>
-          </p:nvPr>
-        </p:nvSpPr>
-        <p:spPr>
-          <a:xfrm>
-            <a:off x="838199" y="1825625"/>
-            <a:ext cx="10785793" cy="4351338"/>
-          </a:xfrm>
-        </p:spPr>
-        <p:txBody>
-          <a:bodyPr>
-            <a:normAutofit/>
-          </a:bodyPr>
-          <a:lstStyle/>
-          <a:p>
-            <a:endParaRPr lang="nb-NO" dirty="0"/>
-          </a:p>
-          <a:p>
-            <a:endParaRPr lang="nb-NO" sz="2800" dirty="0"/>
-          </a:p>
-          <a:p>
-            <a:endParaRPr lang="nb-NO" sz="2800" dirty="0"/>
-          </a:p>
-          <a:p>
-            <a:pPr marL="0" indent="0">
-              <a:buNone/>
-            </a:pPr>
-            <a:endParaRPr lang="en-US" sz="2800" dirty="0"/>
-          </a:p>
-        </p:txBody>
-      </p:sp>
     </p:spTree>
     <p:extLst>
       <p:ext uri="{BB962C8B-B14F-4D97-AF65-F5344CB8AC3E}">
@@ -10623,12 +10205,130 @@
           </a:p>
         </p:txBody>
       </p:sp>
+      <p:sp>
+        <p:nvSpPr>
+          <p:cNvPr id="2" name="Title 1">
+            <a:extLst>
+              <a:ext uri="{FF2B5EF4-FFF2-40B4-BE49-F238E27FC236}">
+                <a16:creationId xmlns:a16="http://schemas.microsoft.com/office/drawing/2014/main" id="{044D5C86-6C13-B385-18EB-CE82554A07BC}"/>
+              </a:ext>
+            </a:extLst>
+          </p:cNvPr>
+          <p:cNvSpPr>
+            <a:spLocks noGrp="1"/>
+          </p:cNvSpPr>
+          <p:nvPr>
+            <p:ph type="title"/>
+          </p:nvPr>
+        </p:nvSpPr>
+        <p:spPr>
+          <a:xfrm>
+            <a:off x="1676400" y="-7563"/>
+            <a:ext cx="10515600" cy="1325563"/>
+          </a:xfrm>
+        </p:spPr>
+        <p:txBody>
+          <a:bodyPr>
+            <a:normAutofit/>
+          </a:bodyPr>
+          <a:lstStyle/>
+          <a:p>
+            <a:r>
+              <a:rPr lang="nb-NO" sz="3600" dirty="0"/>
+              <a:t>Geo-SfM platform: Github</a:t>
+            </a:r>
+            <a:endParaRPr lang="en-US" sz="3600" dirty="0"/>
+          </a:p>
+        </p:txBody>
+      </p:sp>
+      <p:sp>
+        <p:nvSpPr>
+          <p:cNvPr id="3" name="Content Placeholder 2">
+            <a:extLst>
+              <a:ext uri="{FF2B5EF4-FFF2-40B4-BE49-F238E27FC236}">
+                <a16:creationId xmlns:a16="http://schemas.microsoft.com/office/drawing/2014/main" id="{2D0EA7A2-E4A5-2799-2A25-121BD1FEE728}"/>
+              </a:ext>
+            </a:extLst>
+          </p:cNvPr>
+          <p:cNvSpPr>
+            <a:spLocks noGrp="1"/>
+          </p:cNvSpPr>
+          <p:nvPr>
+            <p:ph idx="1"/>
+          </p:nvPr>
+        </p:nvSpPr>
+        <p:spPr>
+          <a:xfrm>
+            <a:off x="838199" y="1825625"/>
+            <a:ext cx="10785793" cy="4351338"/>
+          </a:xfrm>
+        </p:spPr>
+        <p:txBody>
+          <a:bodyPr>
+            <a:normAutofit/>
+          </a:bodyPr>
+          <a:lstStyle/>
+          <a:p>
+            <a:pPr marL="0" indent="0">
+              <a:buFont typeface="Arial" panose="020B0604020202020204" pitchFamily="34" charset="0"/>
+              <a:buNone/>
+            </a:pPr>
+            <a:r>
+              <a:rPr lang="nb-NO" dirty="0"/>
+              <a:t>Github: </a:t>
+            </a:r>
+          </a:p>
+          <a:p>
+            <a:r>
+              <a:rPr lang="nb-NO" dirty="0"/>
+              <a:t>User-friendly</a:t>
+            </a:r>
+          </a:p>
+          <a:p>
+            <a:r>
+              <a:rPr lang="nb-NO" dirty="0"/>
+              <a:t>Commercial platform for version control (keep track of changes)...</a:t>
+            </a:r>
+          </a:p>
+          <a:p>
+            <a:r>
+              <a:rPr lang="nb-NO" dirty="0"/>
+              <a:t>... and that facilitates collaboration</a:t>
+            </a:r>
+          </a:p>
+          <a:p>
+            <a:r>
+              <a:rPr lang="nb-NO" dirty="0"/>
+              <a:t>Implements Git</a:t>
+            </a:r>
+          </a:p>
+          <a:p>
+            <a:endParaRPr lang="nb-NO" dirty="0"/>
+          </a:p>
+          <a:p>
+            <a:pPr marL="0" indent="0">
+              <a:buNone/>
+            </a:pPr>
+            <a:endParaRPr lang="nb-NO" dirty="0"/>
+          </a:p>
+          <a:p>
+            <a:pPr marL="0" indent="0">
+              <a:buFont typeface="Arial" panose="020B0604020202020204" pitchFamily="34" charset="0"/>
+              <a:buNone/>
+            </a:pPr>
+            <a:endParaRPr lang="en-US" dirty="0"/>
+          </a:p>
+          <a:p>
+            <a:endParaRPr lang="nb-NO" dirty="0"/>
+          </a:p>
+        </p:txBody>
+      </p:sp>
       <p:grpSp>
         <p:nvGrpSpPr>
-          <p:cNvPr id="23" name="Group 22">
-            <a:extLst>
-              <a:ext uri="{FF2B5EF4-FFF2-40B4-BE49-F238E27FC236}">
-                <a16:creationId xmlns:a16="http://schemas.microsoft.com/office/drawing/2014/main" id="{5C8CC107-8B6F-2BA8-A951-E8276E1CAFC8}"/>
+          <p:cNvPr id="11" name="Group 10">
+            <a:extLst>
+              <a:ext uri="{FF2B5EF4-FFF2-40B4-BE49-F238E27FC236}">
+                <a16:creationId xmlns:a16="http://schemas.microsoft.com/office/drawing/2014/main" id="{D77786E1-4D32-3487-9C8A-73C17FAE4455}"/>
               </a:ext>
             </a:extLst>
           </p:cNvPr>
@@ -10637,65 +10337,23 @@
         </p:nvGrpSpPr>
         <p:grpSpPr>
           <a:xfrm>
-            <a:off x="42671" y="6443508"/>
-            <a:ext cx="12006913" cy="385818"/>
-            <a:chOff x="42671" y="6443508"/>
-            <a:chExt cx="12006913" cy="385818"/>
+            <a:off x="9704900" y="6443508"/>
+            <a:ext cx="2344684" cy="333050"/>
+            <a:chOff x="9704900" y="6443508"/>
+            <a:chExt cx="2344684" cy="333050"/>
           </a:xfrm>
         </p:grpSpPr>
-        <p:sp>
-          <p:nvSpPr>
-            <p:cNvPr id="24" name="TextBox 23">
+        <p:pic>
+          <p:nvPicPr>
+            <p:cNvPr id="12" name="Picture 2" descr="UNIS - The university centre in Svalbard">
               <a:extLst>
                 <a:ext uri="{FF2B5EF4-FFF2-40B4-BE49-F238E27FC236}">
-                  <a16:creationId xmlns:a16="http://schemas.microsoft.com/office/drawing/2014/main" id="{1B538703-361B-3F8B-537E-BBCFEBB6CACC}"/>
-                </a:ext>
-              </a:extLst>
-            </p:cNvPr>
-            <p:cNvSpPr txBox="1"/>
-            <p:nvPr/>
-          </p:nvSpPr>
-          <p:spPr>
-            <a:xfrm>
-              <a:off x="854075" y="6521549"/>
-              <a:ext cx="3805382" cy="307777"/>
-            </a:xfrm>
-            <a:prstGeom prst="rect">
-              <a:avLst/>
-            </a:prstGeom>
-            <a:noFill/>
-          </p:spPr>
-          <p:txBody>
-            <a:bodyPr wrap="square" rtlCol="0">
-              <a:spAutoFit/>
-            </a:bodyPr>
-            <a:lstStyle/>
-            <a:p>
-              <a:r>
-                <a:rPr lang="nb-NO" sz="1400" i="1" dirty="0">
-                  <a:latin typeface="Arial" panose="020B0604020202020204" pitchFamily="34" charset="0"/>
-                  <a:cs typeface="Arial" panose="020B0604020202020204" pitchFamily="34" charset="0"/>
-                </a:rPr>
-                <a:t>FAIR digital documentation &amp; teaching</a:t>
-              </a:r>
-              <a:endParaRPr lang="en-US" sz="1400" i="1" dirty="0">
-                <a:latin typeface="Arial" panose="020B0604020202020204" pitchFamily="34" charset="0"/>
-                <a:cs typeface="Arial" panose="020B0604020202020204" pitchFamily="34" charset="0"/>
-              </a:endParaRPr>
-            </a:p>
-          </p:txBody>
-        </p:sp>
-        <p:pic>
-          <p:nvPicPr>
-            <p:cNvPr id="25" name="Picture 24" descr="A screenshot of a video game&#10;&#10;Description automatically generated">
-              <a:extLst>
-                <a:ext uri="{FF2B5EF4-FFF2-40B4-BE49-F238E27FC236}">
-                  <a16:creationId xmlns:a16="http://schemas.microsoft.com/office/drawing/2014/main" id="{5F21D3D7-314B-1C6E-B50E-93CFE61D5082}"/>
+                  <a16:creationId xmlns:a16="http://schemas.microsoft.com/office/drawing/2014/main" id="{7857D84E-5AB1-BC8C-1788-6378C618ACDB}"/>
                 </a:ext>
               </a:extLst>
             </p:cNvPr>
             <p:cNvPicPr>
-              <a:picLocks noChangeAspect="1"/>
+              <a:picLocks noChangeAspect="1" noChangeArrowheads="1"/>
             </p:cNvPicPr>
             <p:nvPr/>
           </p:nvPicPr>
@@ -10707,26 +10365,37 @@
                 </a:ext>
               </a:extLst>
             </a:blip>
+            <a:srcRect/>
             <a:stretch>
               <a:fillRect/>
             </a:stretch>
           </p:blipFill>
-          <p:spPr>
+          <p:spPr bwMode="auto">
             <a:xfrm>
-              <a:off x="42671" y="6563571"/>
-              <a:ext cx="876716" cy="230005"/>
+              <a:off x="10413848" y="6443508"/>
+              <a:ext cx="1210145" cy="326740"/>
             </a:xfrm>
             <a:prstGeom prst="rect">
               <a:avLst/>
             </a:prstGeom>
+            <a:noFill/>
+            <a:extLst>
+              <a:ext uri="{909E8E84-426E-40DD-AFC4-6F175D3DCCD1}">
+                <a14:hiddenFill xmlns:a14="http://schemas.microsoft.com/office/drawing/2010/main">
+                  <a:solidFill>
+                    <a:srgbClr val="FFFFFF"/>
+                  </a:solidFill>
+                </a14:hiddenFill>
+              </a:ext>
+            </a:extLst>
           </p:spPr>
         </p:pic>
         <p:pic>
           <p:nvPicPr>
-            <p:cNvPr id="26" name="Picture 2" descr="UNIS - The university centre in Svalbard">
+            <p:cNvPr id="14" name="Picture 2" descr="Site is undergoing maintenance">
               <a:extLst>
                 <a:ext uri="{FF2B5EF4-FFF2-40B4-BE49-F238E27FC236}">
-                  <a16:creationId xmlns:a16="http://schemas.microsoft.com/office/drawing/2014/main" id="{3FBB4A11-E9C3-D45E-8EDE-6CF34C32E59B}"/>
+                  <a16:creationId xmlns:a16="http://schemas.microsoft.com/office/drawing/2014/main" id="{7B95A598-3FDF-9702-5ECD-CAF14104B09C}"/>
                 </a:ext>
               </a:extLst>
             </p:cNvPr>
@@ -10750,8 +10419,8 @@
           </p:blipFill>
           <p:spPr bwMode="auto">
             <a:xfrm>
-              <a:off x="10413848" y="6443508"/>
-              <a:ext cx="1210145" cy="326740"/>
+              <a:off x="11766409" y="6449818"/>
+              <a:ext cx="283175" cy="326740"/>
             </a:xfrm>
             <a:prstGeom prst="rect">
               <a:avLst/>
@@ -10770,15 +10439,15 @@
         </p:pic>
         <p:pic>
           <p:nvPicPr>
-            <p:cNvPr id="27" name="Picture 2" descr="Site is undergoing maintenance">
+            <p:cNvPr id="15" name="Picture 14" descr="A black background with grey letters and a red triangle&#10;&#10;Description automatically generated">
               <a:extLst>
                 <a:ext uri="{FF2B5EF4-FFF2-40B4-BE49-F238E27FC236}">
-                  <a16:creationId xmlns:a16="http://schemas.microsoft.com/office/drawing/2014/main" id="{A9B52DA7-A2A2-0059-A038-02CDC274F002}"/>
+                  <a16:creationId xmlns:a16="http://schemas.microsoft.com/office/drawing/2014/main" id="{6E365E64-C540-08E9-5D2B-58B832F4B2C6}"/>
                 </a:ext>
               </a:extLst>
             </p:cNvPr>
             <p:cNvPicPr>
-              <a:picLocks noChangeAspect="1" noChangeArrowheads="1"/>
+              <a:picLocks noChangeAspect="1"/>
             </p:cNvPicPr>
             <p:nvPr/>
           </p:nvPicPr>
@@ -10790,150 +10459,21 @@
                 </a:ext>
               </a:extLst>
             </a:blip>
-            <a:srcRect/>
             <a:stretch>
               <a:fillRect/>
             </a:stretch>
           </p:blipFill>
-          <p:spPr bwMode="auto">
+          <p:spPr>
             <a:xfrm>
-              <a:off x="11766409" y="6449818"/>
-              <a:ext cx="283175" cy="326740"/>
+              <a:off x="9704900" y="6486750"/>
+              <a:ext cx="580285" cy="270414"/>
             </a:xfrm>
             <a:prstGeom prst="rect">
               <a:avLst/>
             </a:prstGeom>
-            <a:noFill/>
-            <a:extLst>
-              <a:ext uri="{909E8E84-426E-40DD-AFC4-6F175D3DCCD1}">
-                <a14:hiddenFill xmlns:a14="http://schemas.microsoft.com/office/drawing/2010/main">
-                  <a:solidFill>
-                    <a:srgbClr val="FFFFFF"/>
-                  </a:solidFill>
-                </a14:hiddenFill>
-              </a:ext>
-            </a:extLst>
           </p:spPr>
         </p:pic>
       </p:grpSp>
-      <p:sp>
-        <p:nvSpPr>
-          <p:cNvPr id="2" name="Title 1">
-            <a:extLst>
-              <a:ext uri="{FF2B5EF4-FFF2-40B4-BE49-F238E27FC236}">
-                <a16:creationId xmlns:a16="http://schemas.microsoft.com/office/drawing/2014/main" id="{044D5C86-6C13-B385-18EB-CE82554A07BC}"/>
-              </a:ext>
-            </a:extLst>
-          </p:cNvPr>
-          <p:cNvSpPr>
-            <a:spLocks noGrp="1"/>
-          </p:cNvSpPr>
-          <p:nvPr>
-            <p:ph type="title"/>
-          </p:nvPr>
-        </p:nvSpPr>
-        <p:spPr>
-          <a:xfrm>
-            <a:off x="1676400" y="-7563"/>
-            <a:ext cx="10515600" cy="1325563"/>
-          </a:xfrm>
-        </p:spPr>
-        <p:txBody>
-          <a:bodyPr>
-            <a:normAutofit/>
-          </a:bodyPr>
-          <a:lstStyle/>
-          <a:p>
-            <a:r>
-              <a:rPr lang="nb-NO" sz="3600" dirty="0"/>
-              <a:t>Geo-SfM platform: Github</a:t>
-            </a:r>
-            <a:endParaRPr lang="en-US" sz="3600" dirty="0"/>
-          </a:p>
-        </p:txBody>
-      </p:sp>
-      <p:sp>
-        <p:nvSpPr>
-          <p:cNvPr id="3" name="Content Placeholder 2">
-            <a:extLst>
-              <a:ext uri="{FF2B5EF4-FFF2-40B4-BE49-F238E27FC236}">
-                <a16:creationId xmlns:a16="http://schemas.microsoft.com/office/drawing/2014/main" id="{2D0EA7A2-E4A5-2799-2A25-121BD1FEE728}"/>
-              </a:ext>
-            </a:extLst>
-          </p:cNvPr>
-          <p:cNvSpPr>
-            <a:spLocks noGrp="1"/>
-          </p:cNvSpPr>
-          <p:nvPr>
-            <p:ph idx="1"/>
-          </p:nvPr>
-        </p:nvSpPr>
-        <p:spPr>
-          <a:xfrm>
-            <a:off x="838199" y="1825625"/>
-            <a:ext cx="10785793" cy="4351338"/>
-          </a:xfrm>
-        </p:spPr>
-        <p:txBody>
-          <a:bodyPr>
-            <a:normAutofit/>
-          </a:bodyPr>
-          <a:lstStyle/>
-          <a:p>
-            <a:pPr marL="0" indent="0">
-              <a:buFont typeface="Arial" panose="020B0604020202020204" pitchFamily="34" charset="0"/>
-              <a:buNone/>
-            </a:pPr>
-            <a:r>
-              <a:rPr lang="nb-NO" dirty="0"/>
-              <a:t>Github: </a:t>
-            </a:r>
-          </a:p>
-          <a:p>
-            <a:r>
-              <a:rPr lang="nb-NO" dirty="0"/>
-              <a:t>User-friendly</a:t>
-            </a:r>
-          </a:p>
-          <a:p>
-            <a:r>
-              <a:rPr lang="nb-NO" dirty="0"/>
-              <a:t>Commercial platform for version control (keep track of changes)...</a:t>
-            </a:r>
-          </a:p>
-          <a:p>
-            <a:r>
-              <a:rPr lang="nb-NO" dirty="0"/>
-              <a:t>... and that facilitates collaboration</a:t>
-            </a:r>
-          </a:p>
-          <a:p>
-            <a:r>
-              <a:rPr lang="nb-NO" dirty="0"/>
-              <a:t>Implements Git</a:t>
-            </a:r>
-          </a:p>
-          <a:p>
-            <a:endParaRPr lang="nb-NO" dirty="0"/>
-          </a:p>
-          <a:p>
-            <a:pPr marL="0" indent="0">
-              <a:buNone/>
-            </a:pPr>
-            <a:endParaRPr lang="nb-NO" dirty="0"/>
-          </a:p>
-          <a:p>
-            <a:pPr marL="0" indent="0">
-              <a:buFont typeface="Arial" panose="020B0604020202020204" pitchFamily="34" charset="0"/>
-              <a:buNone/>
-            </a:pPr>
-            <a:endParaRPr lang="en-US" dirty="0"/>
-          </a:p>
-          <a:p>
-            <a:endParaRPr lang="nb-NO" dirty="0"/>
-          </a:p>
-        </p:txBody>
-      </p:sp>
     </p:spTree>
     <p:extLst>
       <p:ext uri="{BB962C8B-B14F-4D97-AF65-F5344CB8AC3E}">
@@ -11714,12 +11254,139 @@
           </a:p>
         </p:txBody>
       </p:sp>
+      <p:sp>
+        <p:nvSpPr>
+          <p:cNvPr id="2" name="Title 1">
+            <a:extLst>
+              <a:ext uri="{FF2B5EF4-FFF2-40B4-BE49-F238E27FC236}">
+                <a16:creationId xmlns:a16="http://schemas.microsoft.com/office/drawing/2014/main" id="{044D5C86-6C13-B385-18EB-CE82554A07BC}"/>
+              </a:ext>
+            </a:extLst>
+          </p:cNvPr>
+          <p:cNvSpPr>
+            <a:spLocks noGrp="1"/>
+          </p:cNvSpPr>
+          <p:nvPr>
+            <p:ph type="title"/>
+          </p:nvPr>
+        </p:nvSpPr>
+        <p:spPr>
+          <a:xfrm>
+            <a:off x="1676400" y="-7563"/>
+            <a:ext cx="10515600" cy="1325563"/>
+          </a:xfrm>
+        </p:spPr>
+        <p:txBody>
+          <a:bodyPr>
+            <a:normAutofit/>
+          </a:bodyPr>
+          <a:lstStyle/>
+          <a:p>
+            <a:r>
+              <a:rPr lang="nb-NO" sz="3600" dirty="0"/>
+              <a:t>Geo-SfM platform: Github</a:t>
+            </a:r>
+            <a:endParaRPr lang="en-US" sz="3600" dirty="0"/>
+          </a:p>
+        </p:txBody>
+      </p:sp>
+      <p:sp>
+        <p:nvSpPr>
+          <p:cNvPr id="3" name="Content Placeholder 2">
+            <a:extLst>
+              <a:ext uri="{FF2B5EF4-FFF2-40B4-BE49-F238E27FC236}">
+                <a16:creationId xmlns:a16="http://schemas.microsoft.com/office/drawing/2014/main" id="{2D0EA7A2-E4A5-2799-2A25-121BD1FEE728}"/>
+              </a:ext>
+            </a:extLst>
+          </p:cNvPr>
+          <p:cNvSpPr>
+            <a:spLocks noGrp="1"/>
+          </p:cNvSpPr>
+          <p:nvPr>
+            <p:ph idx="1"/>
+          </p:nvPr>
+        </p:nvSpPr>
+        <p:spPr>
+          <a:xfrm>
+            <a:off x="838199" y="1825625"/>
+            <a:ext cx="10785793" cy="4351338"/>
+          </a:xfrm>
+        </p:spPr>
+        <p:txBody>
+          <a:bodyPr>
+            <a:normAutofit/>
+          </a:bodyPr>
+          <a:lstStyle/>
+          <a:p>
+            <a:pPr marL="0" indent="0">
+              <a:buFont typeface="Arial" panose="020B0604020202020204" pitchFamily="34" charset="0"/>
+              <a:buNone/>
+            </a:pPr>
+            <a:r>
+              <a:rPr lang="nb-NO" dirty="0"/>
+              <a:t>Github: </a:t>
+            </a:r>
+          </a:p>
+          <a:p>
+            <a:r>
+              <a:rPr lang="nb-NO" dirty="0"/>
+              <a:t>User-friendly</a:t>
+            </a:r>
+          </a:p>
+          <a:p>
+            <a:r>
+              <a:rPr lang="nb-NO" dirty="0"/>
+              <a:t>Commercial platform for version control (keep track of changes)...</a:t>
+            </a:r>
+          </a:p>
+          <a:p>
+            <a:r>
+              <a:rPr lang="nb-NO" dirty="0"/>
+              <a:t>... and that facilitates collaboration</a:t>
+            </a:r>
+          </a:p>
+          <a:p>
+            <a:r>
+              <a:rPr lang="nb-NO" dirty="0"/>
+              <a:t>Implements Git</a:t>
+            </a:r>
+          </a:p>
+          <a:p>
+            <a:endParaRPr lang="nb-NO" dirty="0"/>
+          </a:p>
+          <a:p>
+            <a:pPr marL="0" indent="0">
+              <a:buNone/>
+            </a:pPr>
+            <a:r>
+              <a:rPr lang="nb-NO" dirty="0"/>
+              <a:t>Before we begin: </a:t>
+            </a:r>
+          </a:p>
+          <a:p>
+            <a:r>
+              <a:rPr lang="nb-NO" dirty="0"/>
+              <a:t>time to explore the Geo-SfM tutorial and sign up to GitHub</a:t>
+            </a:r>
+          </a:p>
+          <a:p>
+            <a:pPr marL="0" indent="0">
+              <a:buFont typeface="Arial" panose="020B0604020202020204" pitchFamily="34" charset="0"/>
+              <a:buNone/>
+            </a:pPr>
+            <a:endParaRPr lang="en-US" dirty="0"/>
+          </a:p>
+          <a:p>
+            <a:endParaRPr lang="nb-NO" dirty="0"/>
+          </a:p>
+        </p:txBody>
+      </p:sp>
       <p:grpSp>
         <p:nvGrpSpPr>
-          <p:cNvPr id="23" name="Group 22">
-            <a:extLst>
-              <a:ext uri="{FF2B5EF4-FFF2-40B4-BE49-F238E27FC236}">
-                <a16:creationId xmlns:a16="http://schemas.microsoft.com/office/drawing/2014/main" id="{5C8CC107-8B6F-2BA8-A951-E8276E1CAFC8}"/>
+          <p:cNvPr id="11" name="Group 10">
+            <a:extLst>
+              <a:ext uri="{FF2B5EF4-FFF2-40B4-BE49-F238E27FC236}">
+                <a16:creationId xmlns:a16="http://schemas.microsoft.com/office/drawing/2014/main" id="{B0573437-29CC-635C-9E9E-43AD7B223925}"/>
               </a:ext>
             </a:extLst>
           </p:cNvPr>
@@ -11728,65 +11395,23 @@
         </p:nvGrpSpPr>
         <p:grpSpPr>
           <a:xfrm>
-            <a:off x="42671" y="6443508"/>
-            <a:ext cx="12006913" cy="385818"/>
-            <a:chOff x="42671" y="6443508"/>
-            <a:chExt cx="12006913" cy="385818"/>
+            <a:off x="9704900" y="6443508"/>
+            <a:ext cx="2344684" cy="333050"/>
+            <a:chOff x="9704900" y="6443508"/>
+            <a:chExt cx="2344684" cy="333050"/>
           </a:xfrm>
         </p:grpSpPr>
-        <p:sp>
-          <p:nvSpPr>
-            <p:cNvPr id="24" name="TextBox 23">
+        <p:pic>
+          <p:nvPicPr>
+            <p:cNvPr id="12" name="Picture 2" descr="UNIS - The university centre in Svalbard">
               <a:extLst>
                 <a:ext uri="{FF2B5EF4-FFF2-40B4-BE49-F238E27FC236}">
-                  <a16:creationId xmlns:a16="http://schemas.microsoft.com/office/drawing/2014/main" id="{1B538703-361B-3F8B-537E-BBCFEBB6CACC}"/>
-                </a:ext>
-              </a:extLst>
-            </p:cNvPr>
-            <p:cNvSpPr txBox="1"/>
-            <p:nvPr/>
-          </p:nvSpPr>
-          <p:spPr>
-            <a:xfrm>
-              <a:off x="854075" y="6521549"/>
-              <a:ext cx="3805382" cy="307777"/>
-            </a:xfrm>
-            <a:prstGeom prst="rect">
-              <a:avLst/>
-            </a:prstGeom>
-            <a:noFill/>
-          </p:spPr>
-          <p:txBody>
-            <a:bodyPr wrap="square" rtlCol="0">
-              <a:spAutoFit/>
-            </a:bodyPr>
-            <a:lstStyle/>
-            <a:p>
-              <a:r>
-                <a:rPr lang="nb-NO" sz="1400" i="1" dirty="0">
-                  <a:latin typeface="Arial" panose="020B0604020202020204" pitchFamily="34" charset="0"/>
-                  <a:cs typeface="Arial" panose="020B0604020202020204" pitchFamily="34" charset="0"/>
-                </a:rPr>
-                <a:t>FAIR digital documentation &amp; teaching</a:t>
-              </a:r>
-              <a:endParaRPr lang="en-US" sz="1400" i="1" dirty="0">
-                <a:latin typeface="Arial" panose="020B0604020202020204" pitchFamily="34" charset="0"/>
-                <a:cs typeface="Arial" panose="020B0604020202020204" pitchFamily="34" charset="0"/>
-              </a:endParaRPr>
-            </a:p>
-          </p:txBody>
-        </p:sp>
-        <p:pic>
-          <p:nvPicPr>
-            <p:cNvPr id="25" name="Picture 24" descr="A screenshot of a video game&#10;&#10;Description automatically generated">
-              <a:extLst>
-                <a:ext uri="{FF2B5EF4-FFF2-40B4-BE49-F238E27FC236}">
-                  <a16:creationId xmlns:a16="http://schemas.microsoft.com/office/drawing/2014/main" id="{5F21D3D7-314B-1C6E-B50E-93CFE61D5082}"/>
+                  <a16:creationId xmlns:a16="http://schemas.microsoft.com/office/drawing/2014/main" id="{6F1091F6-6E7E-19B8-8C1E-29B760FE6852}"/>
                 </a:ext>
               </a:extLst>
             </p:cNvPr>
             <p:cNvPicPr>
-              <a:picLocks noChangeAspect="1"/>
+              <a:picLocks noChangeAspect="1" noChangeArrowheads="1"/>
             </p:cNvPicPr>
             <p:nvPr/>
           </p:nvPicPr>
@@ -11798,26 +11423,37 @@
                 </a:ext>
               </a:extLst>
             </a:blip>
+            <a:srcRect/>
             <a:stretch>
               <a:fillRect/>
             </a:stretch>
           </p:blipFill>
-          <p:spPr>
+          <p:spPr bwMode="auto">
             <a:xfrm>
-              <a:off x="42671" y="6563571"/>
-              <a:ext cx="876716" cy="230005"/>
+              <a:off x="10413848" y="6443508"/>
+              <a:ext cx="1210145" cy="326740"/>
             </a:xfrm>
             <a:prstGeom prst="rect">
               <a:avLst/>
             </a:prstGeom>
+            <a:noFill/>
+            <a:extLst>
+              <a:ext uri="{909E8E84-426E-40DD-AFC4-6F175D3DCCD1}">
+                <a14:hiddenFill xmlns:a14="http://schemas.microsoft.com/office/drawing/2010/main">
+                  <a:solidFill>
+                    <a:srgbClr val="FFFFFF"/>
+                  </a:solidFill>
+                </a14:hiddenFill>
+              </a:ext>
+            </a:extLst>
           </p:spPr>
         </p:pic>
         <p:pic>
           <p:nvPicPr>
-            <p:cNvPr id="26" name="Picture 2" descr="UNIS - The university centre in Svalbard">
+            <p:cNvPr id="14" name="Picture 2" descr="Site is undergoing maintenance">
               <a:extLst>
                 <a:ext uri="{FF2B5EF4-FFF2-40B4-BE49-F238E27FC236}">
-                  <a16:creationId xmlns:a16="http://schemas.microsoft.com/office/drawing/2014/main" id="{3FBB4A11-E9C3-D45E-8EDE-6CF34C32E59B}"/>
+                  <a16:creationId xmlns:a16="http://schemas.microsoft.com/office/drawing/2014/main" id="{2E1FA754-092F-790E-D6F3-D6E7FFB070F5}"/>
                 </a:ext>
               </a:extLst>
             </p:cNvPr>
@@ -11841,8 +11477,8 @@
           </p:blipFill>
           <p:spPr bwMode="auto">
             <a:xfrm>
-              <a:off x="10413848" y="6443508"/>
-              <a:ext cx="1210145" cy="326740"/>
+              <a:off x="11766409" y="6449818"/>
+              <a:ext cx="283175" cy="326740"/>
             </a:xfrm>
             <a:prstGeom prst="rect">
               <a:avLst/>
@@ -11861,15 +11497,15 @@
         </p:pic>
         <p:pic>
           <p:nvPicPr>
-            <p:cNvPr id="27" name="Picture 2" descr="Site is undergoing maintenance">
+            <p:cNvPr id="15" name="Picture 14" descr="A black background with grey letters and a red triangle&#10;&#10;Description automatically generated">
               <a:extLst>
                 <a:ext uri="{FF2B5EF4-FFF2-40B4-BE49-F238E27FC236}">
-                  <a16:creationId xmlns:a16="http://schemas.microsoft.com/office/drawing/2014/main" id="{A9B52DA7-A2A2-0059-A038-02CDC274F002}"/>
+                  <a16:creationId xmlns:a16="http://schemas.microsoft.com/office/drawing/2014/main" id="{81F33D2E-9031-094B-BD6B-56890A255F33}"/>
                 </a:ext>
               </a:extLst>
             </p:cNvPr>
             <p:cNvPicPr>
-              <a:picLocks noChangeAspect="1" noChangeArrowheads="1"/>
+              <a:picLocks noChangeAspect="1"/>
             </p:cNvPicPr>
             <p:nvPr/>
           </p:nvPicPr>
@@ -11881,159 +11517,21 @@
                 </a:ext>
               </a:extLst>
             </a:blip>
-            <a:srcRect/>
             <a:stretch>
               <a:fillRect/>
             </a:stretch>
           </p:blipFill>
-          <p:spPr bwMode="auto">
+          <p:spPr>
             <a:xfrm>
-              <a:off x="11766409" y="6449818"/>
-              <a:ext cx="283175" cy="326740"/>
+              <a:off x="9704900" y="6486750"/>
+              <a:ext cx="580285" cy="270414"/>
             </a:xfrm>
             <a:prstGeom prst="rect">
               <a:avLst/>
             </a:prstGeom>
-            <a:noFill/>
-            <a:extLst>
-              <a:ext uri="{909E8E84-426E-40DD-AFC4-6F175D3DCCD1}">
-                <a14:hiddenFill xmlns:a14="http://schemas.microsoft.com/office/drawing/2010/main">
-                  <a:solidFill>
-                    <a:srgbClr val="FFFFFF"/>
-                  </a:solidFill>
-                </a14:hiddenFill>
-              </a:ext>
-            </a:extLst>
           </p:spPr>
         </p:pic>
       </p:grpSp>
-      <p:sp>
-        <p:nvSpPr>
-          <p:cNvPr id="2" name="Title 1">
-            <a:extLst>
-              <a:ext uri="{FF2B5EF4-FFF2-40B4-BE49-F238E27FC236}">
-                <a16:creationId xmlns:a16="http://schemas.microsoft.com/office/drawing/2014/main" id="{044D5C86-6C13-B385-18EB-CE82554A07BC}"/>
-              </a:ext>
-            </a:extLst>
-          </p:cNvPr>
-          <p:cNvSpPr>
-            <a:spLocks noGrp="1"/>
-          </p:cNvSpPr>
-          <p:nvPr>
-            <p:ph type="title"/>
-          </p:nvPr>
-        </p:nvSpPr>
-        <p:spPr>
-          <a:xfrm>
-            <a:off x="1676400" y="-7563"/>
-            <a:ext cx="10515600" cy="1325563"/>
-          </a:xfrm>
-        </p:spPr>
-        <p:txBody>
-          <a:bodyPr>
-            <a:normAutofit/>
-          </a:bodyPr>
-          <a:lstStyle/>
-          <a:p>
-            <a:r>
-              <a:rPr lang="nb-NO" sz="3600" dirty="0"/>
-              <a:t>Geo-SfM platform: Github</a:t>
-            </a:r>
-            <a:endParaRPr lang="en-US" sz="3600" dirty="0"/>
-          </a:p>
-        </p:txBody>
-      </p:sp>
-      <p:sp>
-        <p:nvSpPr>
-          <p:cNvPr id="3" name="Content Placeholder 2">
-            <a:extLst>
-              <a:ext uri="{FF2B5EF4-FFF2-40B4-BE49-F238E27FC236}">
-                <a16:creationId xmlns:a16="http://schemas.microsoft.com/office/drawing/2014/main" id="{2D0EA7A2-E4A5-2799-2A25-121BD1FEE728}"/>
-              </a:ext>
-            </a:extLst>
-          </p:cNvPr>
-          <p:cNvSpPr>
-            <a:spLocks noGrp="1"/>
-          </p:cNvSpPr>
-          <p:nvPr>
-            <p:ph idx="1"/>
-          </p:nvPr>
-        </p:nvSpPr>
-        <p:spPr>
-          <a:xfrm>
-            <a:off x="838199" y="1825625"/>
-            <a:ext cx="10785793" cy="4351338"/>
-          </a:xfrm>
-        </p:spPr>
-        <p:txBody>
-          <a:bodyPr>
-            <a:normAutofit/>
-          </a:bodyPr>
-          <a:lstStyle/>
-          <a:p>
-            <a:pPr marL="0" indent="0">
-              <a:buFont typeface="Arial" panose="020B0604020202020204" pitchFamily="34" charset="0"/>
-              <a:buNone/>
-            </a:pPr>
-            <a:r>
-              <a:rPr lang="nb-NO" dirty="0"/>
-              <a:t>Github: </a:t>
-            </a:r>
-          </a:p>
-          <a:p>
-            <a:r>
-              <a:rPr lang="nb-NO" dirty="0"/>
-              <a:t>User-friendly</a:t>
-            </a:r>
-          </a:p>
-          <a:p>
-            <a:r>
-              <a:rPr lang="nb-NO" dirty="0"/>
-              <a:t>Commercial platform for version control (keep track of changes)...</a:t>
-            </a:r>
-          </a:p>
-          <a:p>
-            <a:r>
-              <a:rPr lang="nb-NO" dirty="0"/>
-              <a:t>... and that facilitates collaboration</a:t>
-            </a:r>
-          </a:p>
-          <a:p>
-            <a:r>
-              <a:rPr lang="nb-NO" dirty="0"/>
-              <a:t>Implements Git</a:t>
-            </a:r>
-          </a:p>
-          <a:p>
-            <a:endParaRPr lang="nb-NO" dirty="0"/>
-          </a:p>
-          <a:p>
-            <a:pPr marL="0" indent="0">
-              <a:buNone/>
-            </a:pPr>
-            <a:r>
-              <a:rPr lang="nb-NO" dirty="0"/>
-              <a:t>Before we begin: </a:t>
-            </a:r>
-          </a:p>
-          <a:p>
-            <a:r>
-              <a:rPr lang="nb-NO" dirty="0"/>
-              <a:t>time to explore the Geo-SfM tutorial and sign up to GitHub</a:t>
-            </a:r>
-          </a:p>
-          <a:p>
-            <a:pPr marL="0" indent="0">
-              <a:buFont typeface="Arial" panose="020B0604020202020204" pitchFamily="34" charset="0"/>
-              <a:buNone/>
-            </a:pPr>
-            <a:endParaRPr lang="en-US" dirty="0"/>
-          </a:p>
-          <a:p>
-            <a:endParaRPr lang="nb-NO" dirty="0"/>
-          </a:p>
-        </p:txBody>
-      </p:sp>
     </p:spTree>
     <p:extLst>
       <p:ext uri="{BB962C8B-B14F-4D97-AF65-F5344CB8AC3E}">

</xml_diff>